<commit_message>
First version of the Powerpoint slides
</commit_message>
<xml_diff>
--- a/Semantic Web.pptx
+++ b/Semantic Web.pptx
@@ -3043,10 +3043,6 @@
             <a:br>
               <a:rPr lang="de-CH" dirty="0" smtClean="0"/>
             </a:br>
-            <a:r>
-              <a:rPr lang="de-CH" sz="3600" dirty="0" smtClean="0"/>
-              <a:t>(and the Web of Things)</a:t>
-            </a:r>
             <a:endParaRPr lang="de-CH" sz="3600" dirty="0"/>
           </a:p>
         </p:txBody>
@@ -3594,9 +3590,402 @@
   <p:timing>
     <p:tnLst>
       <p:par>
-        <p:cTn id="1" dur="indefinite" restart="never" nodeType="tmRoot"/>
+        <p:cTn id="1" dur="indefinite" restart="never" nodeType="tmRoot">
+          <p:childTnLst>
+            <p:seq concurrent="1" nextAc="seek">
+              <p:cTn id="2" dur="indefinite" nodeType="mainSeq">
+                <p:childTnLst>
+                  <p:par>
+                    <p:cTn id="3" fill="hold">
+                      <p:stCondLst>
+                        <p:cond delay="indefinite"/>
+                      </p:stCondLst>
+                      <p:childTnLst>
+                        <p:par>
+                          <p:cTn id="4" fill="hold">
+                            <p:stCondLst>
+                              <p:cond delay="0"/>
+                            </p:stCondLst>
+                            <p:childTnLst>
+                              <p:par>
+                                <p:cTn id="5" presetID="1" presetClass="entr" presetSubtype="0" fill="hold" grpId="0" nodeType="clickEffect">
+                                  <p:stCondLst>
+                                    <p:cond delay="0"/>
+                                  </p:stCondLst>
+                                  <p:childTnLst>
+                                    <p:set>
+                                      <p:cBhvr>
+                                        <p:cTn id="6" dur="1" fill="hold">
+                                          <p:stCondLst>
+                                            <p:cond delay="0"/>
+                                          </p:stCondLst>
+                                        </p:cTn>
+                                        <p:tgtEl>
+                                          <p:spTgt spid="5"/>
+                                        </p:tgtEl>
+                                        <p:attrNameLst>
+                                          <p:attrName>style.visibility</p:attrName>
+                                        </p:attrNameLst>
+                                      </p:cBhvr>
+                                      <p:to>
+                                        <p:strVal val="visible"/>
+                                      </p:to>
+                                    </p:set>
+                                  </p:childTnLst>
+                                </p:cTn>
+                              </p:par>
+                            </p:childTnLst>
+                          </p:cTn>
+                        </p:par>
+                      </p:childTnLst>
+                    </p:cTn>
+                  </p:par>
+                  <p:par>
+                    <p:cTn id="7" fill="hold">
+                      <p:stCondLst>
+                        <p:cond delay="indefinite"/>
+                      </p:stCondLst>
+                      <p:childTnLst>
+                        <p:par>
+                          <p:cTn id="8" fill="hold">
+                            <p:stCondLst>
+                              <p:cond delay="0"/>
+                            </p:stCondLst>
+                            <p:childTnLst>
+                              <p:par>
+                                <p:cTn id="9" presetID="1" presetClass="entr" presetSubtype="0" fill="hold" grpId="0" nodeType="clickEffect">
+                                  <p:stCondLst>
+                                    <p:cond delay="0"/>
+                                  </p:stCondLst>
+                                  <p:childTnLst>
+                                    <p:set>
+                                      <p:cBhvr>
+                                        <p:cTn id="10" dur="1" fill="hold">
+                                          <p:stCondLst>
+                                            <p:cond delay="0"/>
+                                          </p:stCondLst>
+                                        </p:cTn>
+                                        <p:tgtEl>
+                                          <p:spTgt spid="8"/>
+                                        </p:tgtEl>
+                                        <p:attrNameLst>
+                                          <p:attrName>style.visibility</p:attrName>
+                                        </p:attrNameLst>
+                                      </p:cBhvr>
+                                      <p:to>
+                                        <p:strVal val="visible"/>
+                                      </p:to>
+                                    </p:set>
+                                  </p:childTnLst>
+                                </p:cTn>
+                              </p:par>
+                            </p:childTnLst>
+                          </p:cTn>
+                        </p:par>
+                      </p:childTnLst>
+                    </p:cTn>
+                  </p:par>
+                  <p:par>
+                    <p:cTn id="11" fill="hold">
+                      <p:stCondLst>
+                        <p:cond delay="indefinite"/>
+                      </p:stCondLst>
+                      <p:childTnLst>
+                        <p:par>
+                          <p:cTn id="12" fill="hold">
+                            <p:stCondLst>
+                              <p:cond delay="0"/>
+                            </p:stCondLst>
+                            <p:childTnLst>
+                              <p:par>
+                                <p:cTn id="13" presetID="1" presetClass="entr" presetSubtype="0" fill="hold" grpId="0" nodeType="clickEffect">
+                                  <p:stCondLst>
+                                    <p:cond delay="0"/>
+                                  </p:stCondLst>
+                                  <p:childTnLst>
+                                    <p:set>
+                                      <p:cBhvr>
+                                        <p:cTn id="14" dur="1" fill="hold">
+                                          <p:stCondLst>
+                                            <p:cond delay="0"/>
+                                          </p:stCondLst>
+                                        </p:cTn>
+                                        <p:tgtEl>
+                                          <p:spTgt spid="3"/>
+                                        </p:tgtEl>
+                                        <p:attrNameLst>
+                                          <p:attrName>style.visibility</p:attrName>
+                                        </p:attrNameLst>
+                                      </p:cBhvr>
+                                      <p:to>
+                                        <p:strVal val="visible"/>
+                                      </p:to>
+                                    </p:set>
+                                  </p:childTnLst>
+                                </p:cTn>
+                              </p:par>
+                            </p:childTnLst>
+                          </p:cTn>
+                        </p:par>
+                      </p:childTnLst>
+                    </p:cTn>
+                  </p:par>
+                  <p:par>
+                    <p:cTn id="15" fill="hold">
+                      <p:stCondLst>
+                        <p:cond delay="indefinite"/>
+                      </p:stCondLst>
+                      <p:childTnLst>
+                        <p:par>
+                          <p:cTn id="16" fill="hold">
+                            <p:stCondLst>
+                              <p:cond delay="0"/>
+                            </p:stCondLst>
+                            <p:childTnLst>
+                              <p:par>
+                                <p:cTn id="17" presetID="1" presetClass="entr" presetSubtype="0" fill="hold" grpId="0" nodeType="clickEffect">
+                                  <p:stCondLst>
+                                    <p:cond delay="0"/>
+                                  </p:stCondLst>
+                                  <p:childTnLst>
+                                    <p:set>
+                                      <p:cBhvr>
+                                        <p:cTn id="18" dur="1" fill="hold">
+                                          <p:stCondLst>
+                                            <p:cond delay="0"/>
+                                          </p:stCondLst>
+                                        </p:cTn>
+                                        <p:tgtEl>
+                                          <p:spTgt spid="10"/>
+                                        </p:tgtEl>
+                                        <p:attrNameLst>
+                                          <p:attrName>style.visibility</p:attrName>
+                                        </p:attrNameLst>
+                                      </p:cBhvr>
+                                      <p:to>
+                                        <p:strVal val="visible"/>
+                                      </p:to>
+                                    </p:set>
+                                  </p:childTnLst>
+                                </p:cTn>
+                              </p:par>
+                            </p:childTnLst>
+                          </p:cTn>
+                        </p:par>
+                      </p:childTnLst>
+                    </p:cTn>
+                  </p:par>
+                  <p:par>
+                    <p:cTn id="19" fill="hold">
+                      <p:stCondLst>
+                        <p:cond delay="indefinite"/>
+                      </p:stCondLst>
+                      <p:childTnLst>
+                        <p:par>
+                          <p:cTn id="20" fill="hold">
+                            <p:stCondLst>
+                              <p:cond delay="0"/>
+                            </p:stCondLst>
+                            <p:childTnLst>
+                              <p:par>
+                                <p:cTn id="21" presetID="1" presetClass="entr" presetSubtype="0" fill="hold" grpId="0" nodeType="clickEffect">
+                                  <p:stCondLst>
+                                    <p:cond delay="0"/>
+                                  </p:stCondLst>
+                                  <p:childTnLst>
+                                    <p:set>
+                                      <p:cBhvr>
+                                        <p:cTn id="22" dur="1" fill="hold">
+                                          <p:stCondLst>
+                                            <p:cond delay="0"/>
+                                          </p:stCondLst>
+                                        </p:cTn>
+                                        <p:tgtEl>
+                                          <p:spTgt spid="11"/>
+                                        </p:tgtEl>
+                                        <p:attrNameLst>
+                                          <p:attrName>style.visibility</p:attrName>
+                                        </p:attrNameLst>
+                                      </p:cBhvr>
+                                      <p:to>
+                                        <p:strVal val="visible"/>
+                                      </p:to>
+                                    </p:set>
+                                  </p:childTnLst>
+                                </p:cTn>
+                              </p:par>
+                            </p:childTnLst>
+                          </p:cTn>
+                        </p:par>
+                      </p:childTnLst>
+                    </p:cTn>
+                  </p:par>
+                  <p:par>
+                    <p:cTn id="23" fill="hold">
+                      <p:stCondLst>
+                        <p:cond delay="indefinite"/>
+                      </p:stCondLst>
+                      <p:childTnLst>
+                        <p:par>
+                          <p:cTn id="24" fill="hold">
+                            <p:stCondLst>
+                              <p:cond delay="0"/>
+                            </p:stCondLst>
+                            <p:childTnLst>
+                              <p:par>
+                                <p:cTn id="25" presetID="1" presetClass="entr" presetSubtype="0" fill="hold" grpId="0" nodeType="clickEffect">
+                                  <p:stCondLst>
+                                    <p:cond delay="0"/>
+                                  </p:stCondLst>
+                                  <p:childTnLst>
+                                    <p:set>
+                                      <p:cBhvr>
+                                        <p:cTn id="26" dur="1" fill="hold">
+                                          <p:stCondLst>
+                                            <p:cond delay="0"/>
+                                          </p:stCondLst>
+                                        </p:cTn>
+                                        <p:tgtEl>
+                                          <p:spTgt spid="12"/>
+                                        </p:tgtEl>
+                                        <p:attrNameLst>
+                                          <p:attrName>style.visibility</p:attrName>
+                                        </p:attrNameLst>
+                                      </p:cBhvr>
+                                      <p:to>
+                                        <p:strVal val="visible"/>
+                                      </p:to>
+                                    </p:set>
+                                  </p:childTnLst>
+                                </p:cTn>
+                              </p:par>
+                            </p:childTnLst>
+                          </p:cTn>
+                        </p:par>
+                      </p:childTnLst>
+                    </p:cTn>
+                  </p:par>
+                  <p:par>
+                    <p:cTn id="27" fill="hold">
+                      <p:stCondLst>
+                        <p:cond delay="indefinite"/>
+                      </p:stCondLst>
+                      <p:childTnLst>
+                        <p:par>
+                          <p:cTn id="28" fill="hold">
+                            <p:stCondLst>
+                              <p:cond delay="0"/>
+                            </p:stCondLst>
+                            <p:childTnLst>
+                              <p:par>
+                                <p:cTn id="29" presetID="1" presetClass="entr" presetSubtype="0" fill="hold" grpId="0" nodeType="clickEffect">
+                                  <p:stCondLst>
+                                    <p:cond delay="0"/>
+                                  </p:stCondLst>
+                                  <p:childTnLst>
+                                    <p:set>
+                                      <p:cBhvr>
+                                        <p:cTn id="30" dur="1" fill="hold">
+                                          <p:stCondLst>
+                                            <p:cond delay="0"/>
+                                          </p:stCondLst>
+                                        </p:cTn>
+                                        <p:tgtEl>
+                                          <p:spTgt spid="13"/>
+                                        </p:tgtEl>
+                                        <p:attrNameLst>
+                                          <p:attrName>style.visibility</p:attrName>
+                                        </p:attrNameLst>
+                                      </p:cBhvr>
+                                      <p:to>
+                                        <p:strVal val="visible"/>
+                                      </p:to>
+                                    </p:set>
+                                  </p:childTnLst>
+                                </p:cTn>
+                              </p:par>
+                            </p:childTnLst>
+                          </p:cTn>
+                        </p:par>
+                      </p:childTnLst>
+                    </p:cTn>
+                  </p:par>
+                  <p:par>
+                    <p:cTn id="31" fill="hold">
+                      <p:stCondLst>
+                        <p:cond delay="indefinite"/>
+                      </p:stCondLst>
+                      <p:childTnLst>
+                        <p:par>
+                          <p:cTn id="32" fill="hold">
+                            <p:stCondLst>
+                              <p:cond delay="0"/>
+                            </p:stCondLst>
+                            <p:childTnLst>
+                              <p:par>
+                                <p:cTn id="33" presetID="1" presetClass="entr" presetSubtype="0" fill="hold" grpId="0" nodeType="clickEffect">
+                                  <p:stCondLst>
+                                    <p:cond delay="0"/>
+                                  </p:stCondLst>
+                                  <p:childTnLst>
+                                    <p:set>
+                                      <p:cBhvr>
+                                        <p:cTn id="34" dur="1" fill="hold">
+                                          <p:stCondLst>
+                                            <p:cond delay="0"/>
+                                          </p:stCondLst>
+                                        </p:cTn>
+                                        <p:tgtEl>
+                                          <p:spTgt spid="14"/>
+                                        </p:tgtEl>
+                                        <p:attrNameLst>
+                                          <p:attrName>style.visibility</p:attrName>
+                                        </p:attrNameLst>
+                                      </p:cBhvr>
+                                      <p:to>
+                                        <p:strVal val="visible"/>
+                                      </p:to>
+                                    </p:set>
+                                  </p:childTnLst>
+                                </p:cTn>
+                              </p:par>
+                            </p:childTnLst>
+                          </p:cTn>
+                        </p:par>
+                      </p:childTnLst>
+                    </p:cTn>
+                  </p:par>
+                </p:childTnLst>
+              </p:cTn>
+              <p:prevCondLst>
+                <p:cond evt="onPrev" delay="0">
+                  <p:tgtEl>
+                    <p:sldTgt/>
+                  </p:tgtEl>
+                </p:cond>
+              </p:prevCondLst>
+              <p:nextCondLst>
+                <p:cond evt="onNext" delay="0">
+                  <p:tgtEl>
+                    <p:sldTgt/>
+                  </p:tgtEl>
+                </p:cond>
+              </p:nextCondLst>
+            </p:seq>
+          </p:childTnLst>
+        </p:cTn>
       </p:par>
     </p:tnLst>
+    <p:bldLst>
+      <p:bldP spid="5" grpId="0"/>
+      <p:bldP spid="8" grpId="0"/>
+      <p:bldP spid="10" grpId="0"/>
+      <p:bldP spid="11" grpId="0"/>
+      <p:bldP spid="12" grpId="0"/>
+      <p:bldP spid="13" grpId="0"/>
+      <p:bldP spid="3" grpId="0"/>
+      <p:bldP spid="14" grpId="0"/>
+    </p:bldLst>
   </p:timing>
 </p:sld>
 </file>
@@ -3654,7 +4043,7 @@
         <p:spPr/>
         <p:txBody>
           <a:bodyPr>
-            <a:normAutofit lnSpcReduction="10000"/>
+            <a:normAutofit/>
           </a:bodyPr>
           <a:lstStyle/>
           <a:p>
@@ -3712,39 +4101,6 @@
             <a:endParaRPr lang="de-CH" dirty="0">
               <a:latin typeface="+mj-lt"/>
             </a:endParaRPr>
-          </a:p>
-          <a:p>
-            <a:pPr marL="0" indent="0">
-              <a:buNone/>
-            </a:pPr>
-            <a:r>
-              <a:rPr lang="de-CH" dirty="0" smtClean="0">
-                <a:latin typeface="+mj-lt"/>
-              </a:rPr>
-              <a:t>All fasteners are dangerous</a:t>
-            </a:r>
-          </a:p>
-          <a:p>
-            <a:pPr marL="0" indent="0">
-              <a:buNone/>
-            </a:pPr>
-            <a:r>
-              <a:rPr lang="de-CH" dirty="0" smtClean="0">
-                <a:latin typeface="+mj-lt"/>
-              </a:rPr>
-              <a:t>BX 3-ME is a fastner</a:t>
-            </a:r>
-          </a:p>
-          <a:p>
-            <a:pPr marL="0" indent="0">
-              <a:buNone/>
-            </a:pPr>
-            <a:r>
-              <a:rPr lang="de-CH" dirty="0" smtClean="0">
-                <a:latin typeface="+mj-lt"/>
-              </a:rPr>
-              <a:t>Therefore, BX 3-ME is the weapon of choice for Hubert!</a:t>
-            </a:r>
           </a:p>
           <a:p>
             <a:pPr marL="0" indent="0">
@@ -3776,14 +4132,60 @@
         </p:blipFill>
         <p:spPr>
           <a:xfrm>
-            <a:off x="7948047" y="4319662"/>
-            <a:ext cx="1828800" cy="1039368"/>
+            <a:off x="8330983" y="4641742"/>
+            <a:ext cx="1953651" cy="1110325"/>
           </a:xfrm>
           <a:prstGeom prst="rect">
             <a:avLst/>
           </a:prstGeom>
         </p:spPr>
       </p:pic>
+      <p:sp>
+        <p:nvSpPr>
+          <p:cNvPr id="5" name="Rectangle 4"/>
+          <p:cNvSpPr/>
+          <p:nvPr/>
+        </p:nvSpPr>
+        <p:spPr>
+          <a:xfrm>
+            <a:off x="838199" y="4712699"/>
+            <a:ext cx="8127570" cy="1200329"/>
+          </a:xfrm>
+          <a:prstGeom prst="rect">
+            <a:avLst/>
+          </a:prstGeom>
+        </p:spPr>
+        <p:txBody>
+          <a:bodyPr wrap="square">
+            <a:spAutoFit/>
+          </a:bodyPr>
+          <a:lstStyle/>
+          <a:p>
+            <a:r>
+              <a:rPr lang="de-CH" sz="2400" dirty="0">
+                <a:latin typeface="Akzidenz Grotesk Light" panose="020B0304020202020203" pitchFamily="34" charset="0"/>
+              </a:rPr>
+              <a:t>All fastening tools are dangerous</a:t>
+            </a:r>
+          </a:p>
+          <a:p>
+            <a:r>
+              <a:rPr lang="de-CH" sz="2400" dirty="0">
+                <a:latin typeface="Akzidenz Grotesk Light" panose="020B0304020202020203" pitchFamily="34" charset="0"/>
+              </a:rPr>
+              <a:t>BX 3-ME is a fastner</a:t>
+            </a:r>
+          </a:p>
+          <a:p>
+            <a:r>
+              <a:rPr lang="de-CH" sz="2400" dirty="0">
+                <a:latin typeface="Akzidenz Grotesk Light" panose="020B0304020202020203" pitchFamily="34" charset="0"/>
+              </a:rPr>
+              <a:t>Therefore, BX 3-ME is the weapon of choice for Hubert!</a:t>
+            </a:r>
+          </a:p>
+        </p:txBody>
+      </p:sp>
     </p:spTree>
     <p:extLst>
       <p:ext uri="{BB962C8B-B14F-4D97-AF65-F5344CB8AC3E}">
@@ -3797,9 +4199,123 @@
   <p:timing>
     <p:tnLst>
       <p:par>
-        <p:cTn id="1" dur="indefinite" restart="never" nodeType="tmRoot"/>
+        <p:cTn id="1" dur="indefinite" restart="never" nodeType="tmRoot">
+          <p:childTnLst>
+            <p:seq concurrent="1" nextAc="seek">
+              <p:cTn id="2" dur="indefinite" nodeType="mainSeq">
+                <p:childTnLst>
+                  <p:par>
+                    <p:cTn id="3" fill="hold">
+                      <p:stCondLst>
+                        <p:cond delay="indefinite"/>
+                      </p:stCondLst>
+                      <p:childTnLst>
+                        <p:par>
+                          <p:cTn id="4" fill="hold">
+                            <p:stCondLst>
+                              <p:cond delay="0"/>
+                            </p:stCondLst>
+                            <p:childTnLst>
+                              <p:par>
+                                <p:cTn id="5" presetID="10" presetClass="entr" presetSubtype="0" fill="hold" grpId="0" nodeType="clickEffect">
+                                  <p:stCondLst>
+                                    <p:cond delay="0"/>
+                                  </p:stCondLst>
+                                  <p:childTnLst>
+                                    <p:set>
+                                      <p:cBhvr>
+                                        <p:cTn id="6" dur="1" fill="hold">
+                                          <p:stCondLst>
+                                            <p:cond delay="0"/>
+                                          </p:stCondLst>
+                                        </p:cTn>
+                                        <p:tgtEl>
+                                          <p:spTgt spid="5"/>
+                                        </p:tgtEl>
+                                        <p:attrNameLst>
+                                          <p:attrName>style.visibility</p:attrName>
+                                        </p:attrNameLst>
+                                      </p:cBhvr>
+                                      <p:to>
+                                        <p:strVal val="visible"/>
+                                      </p:to>
+                                    </p:set>
+                                    <p:animEffect transition="in" filter="fade">
+                                      <p:cBhvr>
+                                        <p:cTn id="7" dur="500"/>
+                                        <p:tgtEl>
+                                          <p:spTgt spid="5"/>
+                                        </p:tgtEl>
+                                      </p:cBhvr>
+                                    </p:animEffect>
+                                  </p:childTnLst>
+                                </p:cTn>
+                              </p:par>
+                              <p:par>
+                                <p:cTn id="8" presetID="10" presetClass="entr" presetSubtype="0" fill="hold" nodeType="withEffect">
+                                  <p:stCondLst>
+                                    <p:cond delay="0"/>
+                                  </p:stCondLst>
+                                  <p:childTnLst>
+                                    <p:set>
+                                      <p:cBhvr>
+                                        <p:cTn id="9" dur="1" fill="hold">
+                                          <p:stCondLst>
+                                            <p:cond delay="0"/>
+                                          </p:stCondLst>
+                                        </p:cTn>
+                                        <p:tgtEl>
+                                          <p:spTgt spid="4"/>
+                                        </p:tgtEl>
+                                        <p:attrNameLst>
+                                          <p:attrName>style.visibility</p:attrName>
+                                        </p:attrNameLst>
+                                      </p:cBhvr>
+                                      <p:to>
+                                        <p:strVal val="visible"/>
+                                      </p:to>
+                                    </p:set>
+                                    <p:animEffect transition="in" filter="fade">
+                                      <p:cBhvr>
+                                        <p:cTn id="10" dur="500"/>
+                                        <p:tgtEl>
+                                          <p:spTgt spid="4"/>
+                                        </p:tgtEl>
+                                      </p:cBhvr>
+                                    </p:animEffect>
+                                  </p:childTnLst>
+                                </p:cTn>
+                              </p:par>
+                            </p:childTnLst>
+                          </p:cTn>
+                        </p:par>
+                      </p:childTnLst>
+                    </p:cTn>
+                  </p:par>
+                </p:childTnLst>
+              </p:cTn>
+              <p:prevCondLst>
+                <p:cond evt="onPrev" delay="0">
+                  <p:tgtEl>
+                    <p:sldTgt/>
+                  </p:tgtEl>
+                </p:cond>
+              </p:prevCondLst>
+              <p:nextCondLst>
+                <p:cond evt="onNext" delay="0">
+                  <p:tgtEl>
+                    <p:sldTgt/>
+                  </p:tgtEl>
+                </p:cond>
+              </p:nextCondLst>
+            </p:seq>
+          </p:childTnLst>
+        </p:cTn>
       </p:par>
     </p:tnLst>
+    <p:bldLst>
+      <p:bldP spid="5" grpId="0"/>
+    </p:bldLst>
   </p:timing>
 </p:sld>
 </file>
@@ -3917,7 +4433,15 @@
             </a:r>
             <a:r>
               <a:rPr lang="de-CH" dirty="0" smtClean="0"/>
-              <a:t> stores Triples -&gt; Query using patterns! </a:t>
+              <a:t> stores Triples -&gt; </a:t>
+            </a:r>
+            <a:r>
+              <a:rPr lang="de-CH" u="sng" dirty="0" smtClean="0"/>
+              <a:t>Query using patterns</a:t>
+            </a:r>
+            <a:r>
+              <a:rPr lang="de-CH" dirty="0" smtClean="0"/>
+              <a:t>! </a:t>
             </a:r>
             <a:endParaRPr lang="de-CH" dirty="0"/>
           </a:p>
@@ -3963,18 +4487,12 @@
             <a:r>
               <a:rPr lang="en-US" sz="2400" dirty="0" smtClean="0">
                 <a:solidFill>
-                  <a:srgbClr val="FF0000"/>
+                  <a:schemeClr val="accent2">
+                    <a:lumMod val="75000"/>
+                  </a:schemeClr>
                 </a:solidFill>
               </a:rPr>
-              <a:t>?tool </a:t>
-            </a:r>
-            <a:r>
-              <a:rPr lang="en-US" sz="2400" dirty="0" err="1" smtClean="0">
-                <a:solidFill>
-                  <a:srgbClr val="FF0000"/>
-                </a:solidFill>
-              </a:rPr>
-              <a:t>rdfs:subClassOf</a:t>
+              <a:t>?tool</a:t>
             </a:r>
             <a:r>
               <a:rPr lang="en-US" sz="2400" dirty="0" smtClean="0">
@@ -3987,10 +4505,12 @@
             <a:r>
               <a:rPr lang="en-US" sz="2400" dirty="0" err="1" smtClean="0">
                 <a:solidFill>
-                  <a:srgbClr val="FF0000"/>
+                  <a:schemeClr val="accent1">
+                    <a:lumMod val="50000"/>
+                  </a:schemeClr>
                 </a:solidFill>
               </a:rPr>
-              <a:t>hilti:CordlessTool</a:t>
+              <a:t>rdfs:subClassOf</a:t>
             </a:r>
             <a:r>
               <a:rPr lang="en-US" sz="2400" dirty="0" smtClean="0">
@@ -3998,6 +4518,24 @@
                   <a:srgbClr val="FF0000"/>
                 </a:solidFill>
               </a:rPr>
+              <a:t> </a:t>
+            </a:r>
+            <a:r>
+              <a:rPr lang="en-US" sz="2400" dirty="0" err="1" smtClean="0">
+                <a:solidFill>
+                  <a:schemeClr val="accent6">
+                    <a:lumMod val="75000"/>
+                  </a:schemeClr>
+                </a:solidFill>
+              </a:rPr>
+              <a:t>hilti:CordlessTool</a:t>
+            </a:r>
+            <a:r>
+              <a:rPr lang="en-US" sz="2400" dirty="0" smtClean="0">
+                <a:solidFill>
+                  <a:srgbClr val="FF0000"/>
+                </a:solidFill>
+              </a:rPr>
               <a:t>.</a:t>
             </a:r>
           </a:p>
@@ -4007,6 +4545,303 @@
               <a:t>}</a:t>
             </a:r>
             <a:endParaRPr lang="de-CH" sz="2400" dirty="0"/>
+          </a:p>
+        </p:txBody>
+      </p:sp>
+      <p:sp>
+        <p:nvSpPr>
+          <p:cNvPr id="3" name="Flowchart: Magnetic Disk 2"/>
+          <p:cNvSpPr/>
+          <p:nvPr/>
+        </p:nvSpPr>
+        <p:spPr>
+          <a:xfrm>
+            <a:off x="7733654" y="5532895"/>
+            <a:ext cx="1123627" cy="790414"/>
+          </a:xfrm>
+          <a:prstGeom prst="flowChartMagneticDisk">
+            <a:avLst/>
+          </a:prstGeom>
+          <a:noFill/>
+          <a:ln>
+            <a:solidFill>
+              <a:schemeClr val="tx1"/>
+            </a:solidFill>
+          </a:ln>
+        </p:spPr>
+        <p:style>
+          <a:lnRef idx="2">
+            <a:schemeClr val="accent1">
+              <a:shade val="50000"/>
+            </a:schemeClr>
+          </a:lnRef>
+          <a:fillRef idx="1">
+            <a:schemeClr val="accent1"/>
+          </a:fillRef>
+          <a:effectRef idx="0">
+            <a:schemeClr val="accent1"/>
+          </a:effectRef>
+          <a:fontRef idx="minor">
+            <a:schemeClr val="lt1"/>
+          </a:fontRef>
+        </p:style>
+        <p:txBody>
+          <a:bodyPr rtlCol="0" anchor="ctr"/>
+          <a:lstStyle/>
+          <a:p>
+            <a:pPr algn="ctr"/>
+            <a:endParaRPr lang="en-GB"/>
+          </a:p>
+        </p:txBody>
+      </p:sp>
+      <p:sp>
+        <p:nvSpPr>
+          <p:cNvPr id="6" name="Rectangle 5"/>
+          <p:cNvSpPr/>
+          <p:nvPr/>
+        </p:nvSpPr>
+        <p:spPr>
+          <a:xfrm>
+            <a:off x="7423684" y="4924520"/>
+            <a:ext cx="1743561" cy="457200"/>
+          </a:xfrm>
+          <a:prstGeom prst="rect">
+            <a:avLst/>
+          </a:prstGeom>
+          <a:noFill/>
+          <a:ln>
+            <a:solidFill>
+              <a:schemeClr val="tx1"/>
+            </a:solidFill>
+          </a:ln>
+        </p:spPr>
+        <p:style>
+          <a:lnRef idx="2">
+            <a:schemeClr val="accent1">
+              <a:shade val="50000"/>
+            </a:schemeClr>
+          </a:lnRef>
+          <a:fillRef idx="1">
+            <a:schemeClr val="accent1"/>
+          </a:fillRef>
+          <a:effectRef idx="0">
+            <a:schemeClr val="accent1"/>
+          </a:effectRef>
+          <a:fontRef idx="minor">
+            <a:schemeClr val="lt1"/>
+          </a:fontRef>
+        </p:style>
+        <p:txBody>
+          <a:bodyPr rtlCol="0" anchor="ctr"/>
+          <a:lstStyle/>
+          <a:p>
+            <a:pPr algn="ctr"/>
+            <a:r>
+              <a:rPr lang="en-GB" dirty="0" smtClean="0">
+                <a:solidFill>
+                  <a:schemeClr val="tx1"/>
+                </a:solidFill>
+              </a:rPr>
+              <a:t>SPARQL Engine</a:t>
+            </a:r>
+            <a:endParaRPr lang="en-GB" dirty="0">
+              <a:solidFill>
+                <a:schemeClr val="tx1"/>
+              </a:solidFill>
+            </a:endParaRPr>
+          </a:p>
+        </p:txBody>
+      </p:sp>
+      <p:cxnSp>
+        <p:nvCxnSpPr>
+          <p:cNvPr id="8" name="Straight Connector 7"/>
+          <p:cNvCxnSpPr>
+            <a:stCxn id="6" idx="2"/>
+            <a:endCxn id="3" idx="1"/>
+          </p:cNvCxnSpPr>
+          <p:nvPr/>
+        </p:nvCxnSpPr>
+        <p:spPr>
+          <a:xfrm>
+            <a:off x="8295465" y="5381720"/>
+            <a:ext cx="3" cy="151175"/>
+          </a:xfrm>
+          <a:prstGeom prst="line">
+            <a:avLst/>
+          </a:prstGeom>
+          <a:ln>
+            <a:solidFill>
+              <a:schemeClr val="tx1"/>
+            </a:solidFill>
+          </a:ln>
+        </p:spPr>
+        <p:style>
+          <a:lnRef idx="1">
+            <a:schemeClr val="accent1"/>
+          </a:lnRef>
+          <a:fillRef idx="0">
+            <a:schemeClr val="accent1"/>
+          </a:fillRef>
+          <a:effectRef idx="0">
+            <a:schemeClr val="accent1"/>
+          </a:effectRef>
+          <a:fontRef idx="minor">
+            <a:schemeClr val="tx1"/>
+          </a:fontRef>
+        </p:style>
+      </p:cxnSp>
+      <p:cxnSp>
+        <p:nvCxnSpPr>
+          <p:cNvPr id="9" name="Straight Connector 8"/>
+          <p:cNvCxnSpPr>
+            <a:endCxn id="6" idx="0"/>
+          </p:cNvCxnSpPr>
+          <p:nvPr/>
+        </p:nvCxnSpPr>
+        <p:spPr>
+          <a:xfrm>
+            <a:off x="8295465" y="4437637"/>
+            <a:ext cx="0" cy="486883"/>
+          </a:xfrm>
+          <a:prstGeom prst="line">
+            <a:avLst/>
+          </a:prstGeom>
+          <a:ln>
+            <a:solidFill>
+              <a:schemeClr val="tx1"/>
+            </a:solidFill>
+          </a:ln>
+        </p:spPr>
+        <p:style>
+          <a:lnRef idx="1">
+            <a:schemeClr val="accent1"/>
+          </a:lnRef>
+          <a:fillRef idx="0">
+            <a:schemeClr val="accent1"/>
+          </a:fillRef>
+          <a:effectRef idx="0">
+            <a:schemeClr val="accent1"/>
+          </a:effectRef>
+          <a:fontRef idx="minor">
+            <a:schemeClr val="tx1"/>
+          </a:fontRef>
+        </p:style>
+      </p:cxnSp>
+      <p:sp>
+        <p:nvSpPr>
+          <p:cNvPr id="11" name="Rectangle 10"/>
+          <p:cNvSpPr/>
+          <p:nvPr/>
+        </p:nvSpPr>
+        <p:spPr>
+          <a:xfrm>
+            <a:off x="7423684" y="3986872"/>
+            <a:ext cx="1743561" cy="457200"/>
+          </a:xfrm>
+          <a:prstGeom prst="rect">
+            <a:avLst/>
+          </a:prstGeom>
+          <a:noFill/>
+          <a:ln>
+            <a:solidFill>
+              <a:schemeClr val="tx1"/>
+            </a:solidFill>
+          </a:ln>
+        </p:spPr>
+        <p:style>
+          <a:lnRef idx="2">
+            <a:schemeClr val="accent1">
+              <a:shade val="50000"/>
+            </a:schemeClr>
+          </a:lnRef>
+          <a:fillRef idx="1">
+            <a:schemeClr val="accent1"/>
+          </a:fillRef>
+          <a:effectRef idx="0">
+            <a:schemeClr val="accent1"/>
+          </a:effectRef>
+          <a:fontRef idx="minor">
+            <a:schemeClr val="lt1"/>
+          </a:fontRef>
+        </p:style>
+        <p:txBody>
+          <a:bodyPr rtlCol="0" anchor="ctr"/>
+          <a:lstStyle/>
+          <a:p>
+            <a:pPr algn="ctr"/>
+            <a:r>
+              <a:rPr lang="en-GB" dirty="0" smtClean="0">
+                <a:solidFill>
+                  <a:schemeClr val="tx1"/>
+                </a:solidFill>
+              </a:rPr>
+              <a:t>SPARQL Client</a:t>
+            </a:r>
+            <a:endParaRPr lang="en-GB" dirty="0">
+              <a:solidFill>
+                <a:schemeClr val="tx1"/>
+              </a:solidFill>
+            </a:endParaRPr>
+          </a:p>
+        </p:txBody>
+      </p:sp>
+      <p:sp>
+        <p:nvSpPr>
+          <p:cNvPr id="14" name="TextBox 13"/>
+          <p:cNvSpPr txBox="1"/>
+          <p:nvPr/>
+        </p:nvSpPr>
+        <p:spPr>
+          <a:xfrm>
+            <a:off x="8295464" y="4542032"/>
+            <a:ext cx="3453446" cy="307777"/>
+          </a:xfrm>
+          <a:prstGeom prst="rect">
+            <a:avLst/>
+          </a:prstGeom>
+          <a:noFill/>
+        </p:spPr>
+        <p:txBody>
+          <a:bodyPr wrap="none" rtlCol="0">
+            <a:spAutoFit/>
+          </a:bodyPr>
+          <a:lstStyle/>
+          <a:p>
+            <a:r>
+              <a:rPr lang="en-GB" sz="1400" dirty="0" smtClean="0"/>
+              <a:t>Request response in JSON (SPARQL REST API)</a:t>
+            </a:r>
+            <a:endParaRPr lang="en-GB" sz="1400" dirty="0"/>
+          </a:p>
+        </p:txBody>
+      </p:sp>
+      <p:sp>
+        <p:nvSpPr>
+          <p:cNvPr id="15" name="TextBox 14"/>
+          <p:cNvSpPr txBox="1"/>
+          <p:nvPr/>
+        </p:nvSpPr>
+        <p:spPr>
+          <a:xfrm>
+            <a:off x="8950271" y="5770096"/>
+            <a:ext cx="1253548" cy="369332"/>
+          </a:xfrm>
+          <a:prstGeom prst="rect">
+            <a:avLst/>
+          </a:prstGeom>
+          <a:noFill/>
+        </p:spPr>
+        <p:txBody>
+          <a:bodyPr wrap="none" rtlCol="0">
+            <a:spAutoFit/>
+          </a:bodyPr>
+          <a:lstStyle/>
+          <a:p>
+            <a:r>
+              <a:rPr lang="en-GB" dirty="0" smtClean="0"/>
+              <a:t>Triple Store</a:t>
+            </a:r>
+            <a:endParaRPr lang="en-GB" dirty="0"/>
           </a:p>
         </p:txBody>
       </p:sp>
@@ -4023,9 +4858,348 @@
   <p:timing>
     <p:tnLst>
       <p:par>
-        <p:cTn id="1" dur="indefinite" restart="never" nodeType="tmRoot"/>
+        <p:cTn id="1" dur="indefinite" restart="never" nodeType="tmRoot">
+          <p:childTnLst>
+            <p:seq concurrent="1" nextAc="seek">
+              <p:cTn id="2" dur="indefinite" nodeType="mainSeq">
+                <p:childTnLst>
+                  <p:par>
+                    <p:cTn id="3" fill="hold">
+                      <p:stCondLst>
+                        <p:cond delay="indefinite"/>
+                      </p:stCondLst>
+                      <p:childTnLst>
+                        <p:par>
+                          <p:cTn id="4" fill="hold">
+                            <p:stCondLst>
+                              <p:cond delay="0"/>
+                            </p:stCondLst>
+                            <p:childTnLst>
+                              <p:par>
+                                <p:cTn id="5" presetID="1" presetClass="entr" presetSubtype="0" fill="hold" grpId="0" nodeType="clickEffect">
+                                  <p:stCondLst>
+                                    <p:cond delay="0"/>
+                                  </p:stCondLst>
+                                  <p:childTnLst>
+                                    <p:set>
+                                      <p:cBhvr>
+                                        <p:cTn id="6" dur="1" fill="hold">
+                                          <p:stCondLst>
+                                            <p:cond delay="0"/>
+                                          </p:stCondLst>
+                                        </p:cTn>
+                                        <p:tgtEl>
+                                          <p:spTgt spid="5"/>
+                                        </p:tgtEl>
+                                        <p:attrNameLst>
+                                          <p:attrName>style.visibility</p:attrName>
+                                        </p:attrNameLst>
+                                      </p:cBhvr>
+                                      <p:to>
+                                        <p:strVal val="visible"/>
+                                      </p:to>
+                                    </p:set>
+                                  </p:childTnLst>
+                                </p:cTn>
+                              </p:par>
+                            </p:childTnLst>
+                          </p:cTn>
+                        </p:par>
+                      </p:childTnLst>
+                    </p:cTn>
+                  </p:par>
+                  <p:par>
+                    <p:cTn id="7" fill="hold">
+                      <p:stCondLst>
+                        <p:cond delay="indefinite"/>
+                      </p:stCondLst>
+                      <p:childTnLst>
+                        <p:par>
+                          <p:cTn id="8" fill="hold">
+                            <p:stCondLst>
+                              <p:cond delay="0"/>
+                            </p:stCondLst>
+                            <p:childTnLst>
+                              <p:par>
+                                <p:cTn id="9" presetID="10" presetClass="entr" presetSubtype="0" fill="hold" grpId="0" nodeType="clickEffect">
+                                  <p:stCondLst>
+                                    <p:cond delay="0"/>
+                                  </p:stCondLst>
+                                  <p:childTnLst>
+                                    <p:set>
+                                      <p:cBhvr>
+                                        <p:cTn id="10" dur="1" fill="hold">
+                                          <p:stCondLst>
+                                            <p:cond delay="0"/>
+                                          </p:stCondLst>
+                                        </p:cTn>
+                                        <p:tgtEl>
+                                          <p:spTgt spid="3"/>
+                                        </p:tgtEl>
+                                        <p:attrNameLst>
+                                          <p:attrName>style.visibility</p:attrName>
+                                        </p:attrNameLst>
+                                      </p:cBhvr>
+                                      <p:to>
+                                        <p:strVal val="visible"/>
+                                      </p:to>
+                                    </p:set>
+                                    <p:animEffect transition="in" filter="fade">
+                                      <p:cBhvr>
+                                        <p:cTn id="11" dur="500"/>
+                                        <p:tgtEl>
+                                          <p:spTgt spid="3"/>
+                                        </p:tgtEl>
+                                      </p:cBhvr>
+                                    </p:animEffect>
+                                  </p:childTnLst>
+                                </p:cTn>
+                              </p:par>
+                              <p:par>
+                                <p:cTn id="12" presetID="10" presetClass="entr" presetSubtype="0" fill="hold" grpId="0" nodeType="withEffect">
+                                  <p:stCondLst>
+                                    <p:cond delay="0"/>
+                                  </p:stCondLst>
+                                  <p:childTnLst>
+                                    <p:set>
+                                      <p:cBhvr>
+                                        <p:cTn id="13" dur="1" fill="hold">
+                                          <p:stCondLst>
+                                            <p:cond delay="0"/>
+                                          </p:stCondLst>
+                                        </p:cTn>
+                                        <p:tgtEl>
+                                          <p:spTgt spid="6"/>
+                                        </p:tgtEl>
+                                        <p:attrNameLst>
+                                          <p:attrName>style.visibility</p:attrName>
+                                        </p:attrNameLst>
+                                      </p:cBhvr>
+                                      <p:to>
+                                        <p:strVal val="visible"/>
+                                      </p:to>
+                                    </p:set>
+                                    <p:animEffect transition="in" filter="fade">
+                                      <p:cBhvr>
+                                        <p:cTn id="14" dur="500"/>
+                                        <p:tgtEl>
+                                          <p:spTgt spid="6"/>
+                                        </p:tgtEl>
+                                      </p:cBhvr>
+                                    </p:animEffect>
+                                  </p:childTnLst>
+                                </p:cTn>
+                              </p:par>
+                              <p:par>
+                                <p:cTn id="15" presetID="10" presetClass="entr" presetSubtype="0" fill="hold" nodeType="withEffect">
+                                  <p:stCondLst>
+                                    <p:cond delay="0"/>
+                                  </p:stCondLst>
+                                  <p:childTnLst>
+                                    <p:set>
+                                      <p:cBhvr>
+                                        <p:cTn id="16" dur="1" fill="hold">
+                                          <p:stCondLst>
+                                            <p:cond delay="0"/>
+                                          </p:stCondLst>
+                                        </p:cTn>
+                                        <p:tgtEl>
+                                          <p:spTgt spid="8"/>
+                                        </p:tgtEl>
+                                        <p:attrNameLst>
+                                          <p:attrName>style.visibility</p:attrName>
+                                        </p:attrNameLst>
+                                      </p:cBhvr>
+                                      <p:to>
+                                        <p:strVal val="visible"/>
+                                      </p:to>
+                                    </p:set>
+                                    <p:animEffect transition="in" filter="fade">
+                                      <p:cBhvr>
+                                        <p:cTn id="17" dur="500"/>
+                                        <p:tgtEl>
+                                          <p:spTgt spid="8"/>
+                                        </p:tgtEl>
+                                      </p:cBhvr>
+                                    </p:animEffect>
+                                  </p:childTnLst>
+                                </p:cTn>
+                              </p:par>
+                              <p:par>
+                                <p:cTn id="18" presetID="10" presetClass="entr" presetSubtype="0" fill="hold" nodeType="withEffect">
+                                  <p:stCondLst>
+                                    <p:cond delay="0"/>
+                                  </p:stCondLst>
+                                  <p:childTnLst>
+                                    <p:set>
+                                      <p:cBhvr>
+                                        <p:cTn id="19" dur="1" fill="hold">
+                                          <p:stCondLst>
+                                            <p:cond delay="0"/>
+                                          </p:stCondLst>
+                                        </p:cTn>
+                                        <p:tgtEl>
+                                          <p:spTgt spid="9"/>
+                                        </p:tgtEl>
+                                        <p:attrNameLst>
+                                          <p:attrName>style.visibility</p:attrName>
+                                        </p:attrNameLst>
+                                      </p:cBhvr>
+                                      <p:to>
+                                        <p:strVal val="visible"/>
+                                      </p:to>
+                                    </p:set>
+                                    <p:animEffect transition="in" filter="fade">
+                                      <p:cBhvr>
+                                        <p:cTn id="20" dur="500"/>
+                                        <p:tgtEl>
+                                          <p:spTgt spid="9"/>
+                                        </p:tgtEl>
+                                      </p:cBhvr>
+                                    </p:animEffect>
+                                  </p:childTnLst>
+                                </p:cTn>
+                              </p:par>
+                              <p:par>
+                                <p:cTn id="21" presetID="10" presetClass="entr" presetSubtype="0" fill="hold" grpId="0" nodeType="withEffect">
+                                  <p:stCondLst>
+                                    <p:cond delay="0"/>
+                                  </p:stCondLst>
+                                  <p:childTnLst>
+                                    <p:set>
+                                      <p:cBhvr>
+                                        <p:cTn id="22" dur="1" fill="hold">
+                                          <p:stCondLst>
+                                            <p:cond delay="0"/>
+                                          </p:stCondLst>
+                                        </p:cTn>
+                                        <p:tgtEl>
+                                          <p:spTgt spid="11"/>
+                                        </p:tgtEl>
+                                        <p:attrNameLst>
+                                          <p:attrName>style.visibility</p:attrName>
+                                        </p:attrNameLst>
+                                      </p:cBhvr>
+                                      <p:to>
+                                        <p:strVal val="visible"/>
+                                      </p:to>
+                                    </p:set>
+                                    <p:animEffect transition="in" filter="fade">
+                                      <p:cBhvr>
+                                        <p:cTn id="23" dur="500"/>
+                                        <p:tgtEl>
+                                          <p:spTgt spid="11"/>
+                                        </p:tgtEl>
+                                      </p:cBhvr>
+                                    </p:animEffect>
+                                  </p:childTnLst>
+                                </p:cTn>
+                              </p:par>
+                              <p:par>
+                                <p:cTn id="24" presetID="10" presetClass="entr" presetSubtype="0" fill="hold" grpId="0" nodeType="withEffect">
+                                  <p:stCondLst>
+                                    <p:cond delay="0"/>
+                                  </p:stCondLst>
+                                  <p:childTnLst>
+                                    <p:set>
+                                      <p:cBhvr>
+                                        <p:cTn id="25" dur="1" fill="hold">
+                                          <p:stCondLst>
+                                            <p:cond delay="0"/>
+                                          </p:stCondLst>
+                                        </p:cTn>
+                                        <p:tgtEl>
+                                          <p:spTgt spid="14"/>
+                                        </p:tgtEl>
+                                        <p:attrNameLst>
+                                          <p:attrName>style.visibility</p:attrName>
+                                        </p:attrNameLst>
+                                      </p:cBhvr>
+                                      <p:to>
+                                        <p:strVal val="visible"/>
+                                      </p:to>
+                                    </p:set>
+                                    <p:animEffect transition="in" filter="fade">
+                                      <p:cBhvr>
+                                        <p:cTn id="26" dur="500"/>
+                                        <p:tgtEl>
+                                          <p:spTgt spid="14"/>
+                                        </p:tgtEl>
+                                      </p:cBhvr>
+                                    </p:animEffect>
+                                  </p:childTnLst>
+                                </p:cTn>
+                              </p:par>
+                              <p:par>
+                                <p:cTn id="27" presetID="10" presetClass="entr" presetSubtype="0" fill="hold" grpId="0" nodeType="withEffect">
+                                  <p:stCondLst>
+                                    <p:cond delay="0"/>
+                                  </p:stCondLst>
+                                  <p:childTnLst>
+                                    <p:set>
+                                      <p:cBhvr>
+                                        <p:cTn id="28" dur="1" fill="hold">
+                                          <p:stCondLst>
+                                            <p:cond delay="0"/>
+                                          </p:stCondLst>
+                                        </p:cTn>
+                                        <p:tgtEl>
+                                          <p:spTgt spid="15"/>
+                                        </p:tgtEl>
+                                        <p:attrNameLst>
+                                          <p:attrName>style.visibility</p:attrName>
+                                        </p:attrNameLst>
+                                      </p:cBhvr>
+                                      <p:to>
+                                        <p:strVal val="visible"/>
+                                      </p:to>
+                                    </p:set>
+                                    <p:animEffect transition="in" filter="fade">
+                                      <p:cBhvr>
+                                        <p:cTn id="29" dur="500"/>
+                                        <p:tgtEl>
+                                          <p:spTgt spid="15"/>
+                                        </p:tgtEl>
+                                      </p:cBhvr>
+                                    </p:animEffect>
+                                  </p:childTnLst>
+                                </p:cTn>
+                              </p:par>
+                            </p:childTnLst>
+                          </p:cTn>
+                        </p:par>
+                      </p:childTnLst>
+                    </p:cTn>
+                  </p:par>
+                </p:childTnLst>
+              </p:cTn>
+              <p:prevCondLst>
+                <p:cond evt="onPrev" delay="0">
+                  <p:tgtEl>
+                    <p:sldTgt/>
+                  </p:tgtEl>
+                </p:cond>
+              </p:prevCondLst>
+              <p:nextCondLst>
+                <p:cond evt="onNext" delay="0">
+                  <p:tgtEl>
+                    <p:sldTgt/>
+                  </p:tgtEl>
+                </p:cond>
+              </p:nextCondLst>
+            </p:seq>
+          </p:childTnLst>
+        </p:cTn>
       </p:par>
     </p:tnLst>
+    <p:bldLst>
+      <p:bldP spid="5" grpId="0"/>
+      <p:bldP spid="3" grpId="0" animBg="1"/>
+      <p:bldP spid="6" grpId="0" animBg="1"/>
+      <p:bldP spid="11" grpId="0" animBg="1"/>
+      <p:bldP spid="14" grpId="0"/>
+      <p:bldP spid="15" grpId="0"/>
+    </p:bldLst>
   </p:timing>
 </p:sld>
 </file>
@@ -4079,7 +5253,7 @@
         <p:spPr>
           <a:xfrm>
             <a:off x="838200" y="1875354"/>
-            <a:ext cx="7391400" cy="2308324"/>
+            <a:ext cx="7391400" cy="2677656"/>
           </a:xfrm>
           <a:prstGeom prst="rect">
             <a:avLst/>
@@ -4110,7 +5284,9 @@
             <a:r>
               <a:rPr lang="en-US" sz="2400" dirty="0" smtClean="0">
                 <a:solidFill>
-                  <a:srgbClr val="FF0000"/>
+                  <a:schemeClr val="accent2">
+                    <a:lumMod val="75000"/>
+                  </a:schemeClr>
                 </a:solidFill>
               </a:rPr>
               <a:t>?tool </a:t>
@@ -4118,7 +5294,10 @@
             <a:r>
               <a:rPr lang="en-US" sz="2400" dirty="0" err="1" smtClean="0">
                 <a:solidFill>
-                  <a:srgbClr val="FF0000"/>
+                  <a:schemeClr val="accent5">
+                    <a:lumMod val="60000"/>
+                    <a:lumOff val="40000"/>
+                  </a:schemeClr>
                 </a:solidFill>
               </a:rPr>
               <a:t>rdfs:subClassOf</a:t>
@@ -4134,7 +5313,9 @@
             <a:r>
               <a:rPr lang="en-US" sz="2400" dirty="0" err="1" smtClean="0">
                 <a:solidFill>
-                  <a:srgbClr val="FF0000"/>
+                  <a:schemeClr val="accent6">
+                    <a:lumMod val="75000"/>
+                  </a:schemeClr>
                 </a:solidFill>
               </a:rPr>
               <a:t>hilti:CordlessTool</a:t>
@@ -4163,12 +5344,25 @@
                   <a:srgbClr val="FF0000"/>
                 </a:solidFill>
               </a:rPr>
-              <a:t>   ?tool </a:t>
+              <a:t>   </a:t>
+            </a:r>
+            <a:r>
+              <a:rPr lang="en-US" sz="2400" dirty="0" smtClean="0">
+                <a:solidFill>
+                  <a:schemeClr val="accent2">
+                    <a:lumMod val="75000"/>
+                  </a:schemeClr>
+                </a:solidFill>
+              </a:rPr>
+              <a:t>?tool </a:t>
             </a:r>
             <a:r>
               <a:rPr lang="en-US" sz="2400" dirty="0" err="1" smtClean="0">
                 <a:solidFill>
-                  <a:srgbClr val="FF0000"/>
+                  <a:schemeClr val="accent5">
+                    <a:lumMod val="60000"/>
+                    <a:lumOff val="40000"/>
+                  </a:schemeClr>
                 </a:solidFill>
               </a:rPr>
               <a:t>hitli:Fits</a:t>
@@ -4179,12 +5373,24 @@
                   <a:srgbClr val="FF0000"/>
                 </a:solidFill>
               </a:rPr>
-              <a:t> ?</a:t>
+              <a:t> </a:t>
+            </a:r>
+            <a:r>
+              <a:rPr lang="en-US" sz="2400" dirty="0" smtClean="0">
+                <a:solidFill>
+                  <a:schemeClr val="accent6">
+                    <a:lumMod val="50000"/>
+                  </a:schemeClr>
+                </a:solidFill>
+              </a:rPr>
+              <a:t>?</a:t>
             </a:r>
             <a:r>
               <a:rPr lang="en-US" sz="2400" dirty="0" err="1" smtClean="0">
                 <a:solidFill>
-                  <a:srgbClr val="FF0000"/>
+                  <a:schemeClr val="accent6">
+                    <a:lumMod val="50000"/>
+                  </a:schemeClr>
                 </a:solidFill>
               </a:rPr>
               <a:t>fastner</a:t>
@@ -4195,31 +5401,7 @@
                   <a:srgbClr val="FF0000"/>
                 </a:solidFill>
               </a:rPr>
-              <a:t>. ?</a:t>
-            </a:r>
-            <a:r>
-              <a:rPr lang="en-US" sz="2400" dirty="0" err="1" smtClean="0">
-                <a:solidFill>
-                  <a:srgbClr val="FF0000"/>
-                </a:solidFill>
-              </a:rPr>
-              <a:t>fastner</a:t>
-            </a:r>
-            <a:r>
-              <a:rPr lang="en-US" sz="2400" dirty="0" smtClean="0">
-                <a:solidFill>
-                  <a:srgbClr val="FF0000"/>
-                </a:solidFill>
-              </a:rPr>
-              <a:t> a </a:t>
-            </a:r>
-            <a:r>
-              <a:rPr lang="en-US" sz="2400" dirty="0" err="1" smtClean="0">
-                <a:solidFill>
-                  <a:srgbClr val="FF0000"/>
-                </a:solidFill>
-              </a:rPr>
-              <a:t>hilti:Fastener</a:t>
+              <a:t>. </a:t>
             </a:r>
             <a:endParaRPr lang="en-US" sz="2400" dirty="0" smtClean="0">
               <a:solidFill>
@@ -4229,6 +5411,92 @@
           </a:p>
           <a:p>
             <a:r>
+              <a:rPr lang="en-US" sz="2400" dirty="0" smtClean="0">
+                <a:solidFill>
+                  <a:srgbClr val="FF0000"/>
+                </a:solidFill>
+              </a:rPr>
+              <a:t>    </a:t>
+            </a:r>
+            <a:r>
+              <a:rPr lang="en-US" sz="2400" dirty="0" smtClean="0">
+                <a:solidFill>
+                  <a:schemeClr val="accent2">
+                    <a:lumMod val="75000"/>
+                  </a:schemeClr>
+                </a:solidFill>
+              </a:rPr>
+              <a:t>?</a:t>
+            </a:r>
+            <a:r>
+              <a:rPr lang="en-US" sz="2400" dirty="0" err="1" smtClean="0">
+                <a:solidFill>
+                  <a:schemeClr val="accent2">
+                    <a:lumMod val="75000"/>
+                  </a:schemeClr>
+                </a:solidFill>
+              </a:rPr>
+              <a:t>fastner</a:t>
+            </a:r>
+            <a:r>
+              <a:rPr lang="en-US" sz="2400" dirty="0" smtClean="0">
+                <a:solidFill>
+                  <a:schemeClr val="accent2">
+                    <a:lumMod val="75000"/>
+                  </a:schemeClr>
+                </a:solidFill>
+              </a:rPr>
+              <a:t> </a:t>
+            </a:r>
+            <a:r>
+              <a:rPr lang="en-US" sz="2400" dirty="0" smtClean="0">
+                <a:solidFill>
+                  <a:schemeClr val="accent5">
+                    <a:lumMod val="60000"/>
+                    <a:lumOff val="40000"/>
+                  </a:schemeClr>
+                </a:solidFill>
+              </a:rPr>
+              <a:t>a</a:t>
+            </a:r>
+            <a:r>
+              <a:rPr lang="en-US" sz="2400" dirty="0" smtClean="0">
+                <a:solidFill>
+                  <a:srgbClr val="FF0000"/>
+                </a:solidFill>
+              </a:rPr>
+              <a:t> </a:t>
+            </a:r>
+            <a:r>
+              <a:rPr lang="en-US" sz="2400" dirty="0" err="1" smtClean="0">
+                <a:solidFill>
+                  <a:schemeClr val="accent6">
+                    <a:lumMod val="75000"/>
+                  </a:schemeClr>
+                </a:solidFill>
+              </a:rPr>
+              <a:t>hilti:Fastener</a:t>
+            </a:r>
+            <a:r>
+              <a:rPr lang="en-US" sz="2400" dirty="0" smtClean="0">
+                <a:solidFill>
+                  <a:schemeClr val="accent6">
+                    <a:lumMod val="75000"/>
+                  </a:schemeClr>
+                </a:solidFill>
+              </a:rPr>
+              <a:t>.</a:t>
+            </a:r>
+            <a:endParaRPr lang="en-US" sz="2400" dirty="0" smtClean="0">
+              <a:solidFill>
+                <a:schemeClr val="accent6">
+                  <a:lumMod val="75000"/>
+                </a:schemeClr>
+              </a:solidFill>
+            </a:endParaRPr>
+          </a:p>
+          <a:p>
+            <a:r>
               <a:rPr lang="en-US" sz="2400" dirty="0">
                 <a:solidFill>
                   <a:srgbClr val="FF0000"/>
@@ -4263,7 +5531,10 @@
             <a:r>
               <a:rPr lang="en-US" sz="2400" dirty="0" err="1" smtClean="0">
                 <a:solidFill>
-                  <a:srgbClr val="FF0000"/>
+                  <a:schemeClr val="accent5">
+                    <a:lumMod val="60000"/>
+                    <a:lumOff val="40000"/>
+                  </a:schemeClr>
                 </a:solidFill>
               </a:rPr>
               <a:t>hitli:CanBeUsedOn</a:t>
@@ -4279,14 +5550,18 @@
             <a:r>
               <a:rPr lang="en-US" sz="2400" dirty="0" err="1" smtClean="0">
                 <a:solidFill>
-                  <a:srgbClr val="FF0000"/>
+                  <a:schemeClr val="accent6">
+                    <a:lumMod val="50000"/>
+                  </a:schemeClr>
                 </a:solidFill>
               </a:rPr>
               <a:t>BIM:BrickWall</a:t>
             </a:r>
             <a:endParaRPr lang="en-US" sz="2400" dirty="0" smtClean="0">
               <a:solidFill>
-                <a:srgbClr val="FF0000"/>
+                <a:schemeClr val="accent6">
+                  <a:lumMod val="50000"/>
+                </a:schemeClr>
               </a:solidFill>
             </a:endParaRPr>
           </a:p>
@@ -4337,7 +5612,7 @@
         </p:nvSpPr>
         <p:spPr>
           <a:xfrm>
-            <a:off x="838200" y="4615340"/>
+            <a:off x="838200" y="4847814"/>
             <a:ext cx="7391400" cy="1938992"/>
           </a:xfrm>
           <a:prstGeom prst="rect">
@@ -4369,7 +5644,9 @@
             <a:r>
               <a:rPr lang="en-US" sz="2400" dirty="0" smtClean="0">
                 <a:solidFill>
-                  <a:srgbClr val="FF0000"/>
+                  <a:schemeClr val="accent2">
+                    <a:lumMod val="75000"/>
+                  </a:schemeClr>
                 </a:solidFill>
               </a:rPr>
               <a:t>?tool </a:t>
@@ -4377,7 +5654,10 @@
             <a:r>
               <a:rPr lang="en-US" sz="2400" dirty="0" err="1" smtClean="0">
                 <a:solidFill>
-                  <a:srgbClr val="FF0000"/>
+                  <a:schemeClr val="accent5">
+                    <a:lumMod val="60000"/>
+                    <a:lumOff val="40000"/>
+                  </a:schemeClr>
                 </a:solidFill>
               </a:rPr>
               <a:t>rdfs:subClassOf</a:t>
@@ -4393,7 +5673,9 @@
             <a:r>
               <a:rPr lang="en-US" sz="2400" dirty="0" err="1" smtClean="0">
                 <a:solidFill>
-                  <a:srgbClr val="FF0000"/>
+                  <a:schemeClr val="accent6">
+                    <a:lumMod val="75000"/>
+                  </a:schemeClr>
                 </a:solidFill>
               </a:rPr>
               <a:t>hilti:FasteningTool</a:t>
@@ -4414,12 +5696,25 @@
                   <a:srgbClr val="FF0000"/>
                 </a:solidFill>
               </a:rPr>
-              <a:t>    ?tool </a:t>
+              <a:t>    </a:t>
+            </a:r>
+            <a:r>
+              <a:rPr lang="en-US" sz="2400" dirty="0" smtClean="0">
+                <a:solidFill>
+                  <a:schemeClr val="accent2">
+                    <a:lumMod val="75000"/>
+                  </a:schemeClr>
+                </a:solidFill>
+              </a:rPr>
+              <a:t>?tool </a:t>
             </a:r>
             <a:r>
               <a:rPr lang="en-US" sz="2400" dirty="0" err="1" smtClean="0">
                 <a:solidFill>
-                  <a:srgbClr val="FF0000"/>
+                  <a:schemeClr val="accent5">
+                    <a:lumMod val="60000"/>
+                    <a:lumOff val="40000"/>
+                  </a:schemeClr>
                 </a:solidFill>
               </a:rPr>
               <a:t>hitli:CanBeUsedOn</a:t>
@@ -4435,14 +5730,18 @@
             <a:r>
               <a:rPr lang="en-US" sz="2400" dirty="0" err="1" smtClean="0">
                 <a:solidFill>
-                  <a:srgbClr val="FF0000"/>
+                  <a:schemeClr val="accent6">
+                    <a:lumMod val="75000"/>
+                  </a:schemeClr>
                 </a:solidFill>
               </a:rPr>
               <a:t>BIM:BrickWall</a:t>
             </a:r>
             <a:endParaRPr lang="en-US" sz="2400" dirty="0" smtClean="0">
               <a:solidFill>
-                <a:srgbClr val="FF0000"/>
+                <a:schemeClr val="accent6">
+                  <a:lumMod val="75000"/>
+                </a:schemeClr>
               </a:solidFill>
             </a:endParaRPr>
           </a:p>
@@ -4463,7 +5762,7 @@
         </p:nvSpPr>
         <p:spPr>
           <a:xfrm>
-            <a:off x="774915" y="4246008"/>
+            <a:off x="774915" y="4553010"/>
             <a:ext cx="5835765" cy="369332"/>
           </a:xfrm>
           <a:prstGeom prst="rect">
@@ -4498,9 +5797,124 @@
   <p:timing>
     <p:tnLst>
       <p:par>
-        <p:cTn id="1" dur="indefinite" restart="never" nodeType="tmRoot"/>
+        <p:cTn id="1" dur="indefinite" restart="never" nodeType="tmRoot">
+          <p:childTnLst>
+            <p:seq concurrent="1" nextAc="seek">
+              <p:cTn id="2" dur="indefinite" nodeType="mainSeq">
+                <p:childTnLst>
+                  <p:par>
+                    <p:cTn id="3" fill="hold">
+                      <p:stCondLst>
+                        <p:cond delay="indefinite"/>
+                      </p:stCondLst>
+                      <p:childTnLst>
+                        <p:par>
+                          <p:cTn id="4" fill="hold">
+                            <p:stCondLst>
+                              <p:cond delay="0"/>
+                            </p:stCondLst>
+                            <p:childTnLst>
+                              <p:par>
+                                <p:cTn id="5" presetID="10" presetClass="entr" presetSubtype="0" fill="hold" grpId="0" nodeType="clickEffect">
+                                  <p:stCondLst>
+                                    <p:cond delay="0"/>
+                                  </p:stCondLst>
+                                  <p:childTnLst>
+                                    <p:set>
+                                      <p:cBhvr>
+                                        <p:cTn id="6" dur="1" fill="hold">
+                                          <p:stCondLst>
+                                            <p:cond delay="0"/>
+                                          </p:stCondLst>
+                                        </p:cTn>
+                                        <p:tgtEl>
+                                          <p:spTgt spid="7"/>
+                                        </p:tgtEl>
+                                        <p:attrNameLst>
+                                          <p:attrName>style.visibility</p:attrName>
+                                        </p:attrNameLst>
+                                      </p:cBhvr>
+                                      <p:to>
+                                        <p:strVal val="visible"/>
+                                      </p:to>
+                                    </p:set>
+                                    <p:animEffect transition="in" filter="fade">
+                                      <p:cBhvr>
+                                        <p:cTn id="7" dur="500"/>
+                                        <p:tgtEl>
+                                          <p:spTgt spid="7"/>
+                                        </p:tgtEl>
+                                      </p:cBhvr>
+                                    </p:animEffect>
+                                  </p:childTnLst>
+                                </p:cTn>
+                              </p:par>
+                              <p:par>
+                                <p:cTn id="8" presetID="10" presetClass="entr" presetSubtype="0" fill="hold" grpId="0" nodeType="withEffect">
+                                  <p:stCondLst>
+                                    <p:cond delay="0"/>
+                                  </p:stCondLst>
+                                  <p:childTnLst>
+                                    <p:set>
+                                      <p:cBhvr>
+                                        <p:cTn id="9" dur="1" fill="hold">
+                                          <p:stCondLst>
+                                            <p:cond delay="0"/>
+                                          </p:stCondLst>
+                                        </p:cTn>
+                                        <p:tgtEl>
+                                          <p:spTgt spid="6"/>
+                                        </p:tgtEl>
+                                        <p:attrNameLst>
+                                          <p:attrName>style.visibility</p:attrName>
+                                        </p:attrNameLst>
+                                      </p:cBhvr>
+                                      <p:to>
+                                        <p:strVal val="visible"/>
+                                      </p:to>
+                                    </p:set>
+                                    <p:animEffect transition="in" filter="fade">
+                                      <p:cBhvr>
+                                        <p:cTn id="10" dur="500"/>
+                                        <p:tgtEl>
+                                          <p:spTgt spid="6"/>
+                                        </p:tgtEl>
+                                      </p:cBhvr>
+                                    </p:animEffect>
+                                  </p:childTnLst>
+                                </p:cTn>
+                              </p:par>
+                            </p:childTnLst>
+                          </p:cTn>
+                        </p:par>
+                      </p:childTnLst>
+                    </p:cTn>
+                  </p:par>
+                </p:childTnLst>
+              </p:cTn>
+              <p:prevCondLst>
+                <p:cond evt="onPrev" delay="0">
+                  <p:tgtEl>
+                    <p:sldTgt/>
+                  </p:tgtEl>
+                </p:cond>
+              </p:prevCondLst>
+              <p:nextCondLst>
+                <p:cond evt="onNext" delay="0">
+                  <p:tgtEl>
+                    <p:sldTgt/>
+                  </p:tgtEl>
+                </p:cond>
+              </p:nextCondLst>
+            </p:seq>
+          </p:childTnLst>
+        </p:cTn>
       </p:par>
     </p:tnLst>
+    <p:bldLst>
+      <p:bldP spid="6" grpId="0"/>
+      <p:bldP spid="7" grpId="0"/>
+    </p:bldLst>
   </p:timing>
 </p:sld>
 </file>
@@ -4839,126 +6253,6 @@
           </a:prstGeom>
         </p:spPr>
       </p:pic>
-      <p:sp>
-        <p:nvSpPr>
-          <p:cNvPr id="5" name="TextBox 4"/>
-          <p:cNvSpPr txBox="1"/>
-          <p:nvPr/>
-        </p:nvSpPr>
-        <p:spPr>
-          <a:xfrm>
-            <a:off x="4896196" y="5940719"/>
-            <a:ext cx="552011" cy="369332"/>
-          </a:xfrm>
-          <a:prstGeom prst="rect">
-            <a:avLst/>
-          </a:prstGeom>
-          <a:noFill/>
-        </p:spPr>
-        <p:txBody>
-          <a:bodyPr wrap="square" rtlCol="0">
-            <a:spAutoFit/>
-          </a:bodyPr>
-          <a:lstStyle/>
-          <a:p>
-            <a:r>
-              <a:rPr lang="de-CH" dirty="0" smtClean="0"/>
-              <a:t>KOS</a:t>
-            </a:r>
-            <a:endParaRPr lang="de-CH" dirty="0"/>
-          </a:p>
-        </p:txBody>
-      </p:sp>
-      <p:sp>
-        <p:nvSpPr>
-          <p:cNvPr id="7" name="TextBox 6"/>
-          <p:cNvSpPr txBox="1"/>
-          <p:nvPr/>
-        </p:nvSpPr>
-        <p:spPr>
-          <a:xfrm>
-            <a:off x="6096000" y="6225137"/>
-            <a:ext cx="657809" cy="369332"/>
-          </a:xfrm>
-          <a:prstGeom prst="rect">
-            <a:avLst/>
-          </a:prstGeom>
-          <a:noFill/>
-        </p:spPr>
-        <p:txBody>
-          <a:bodyPr wrap="none" rtlCol="0">
-            <a:spAutoFit/>
-          </a:bodyPr>
-          <a:lstStyle/>
-          <a:p>
-            <a:r>
-              <a:rPr lang="de-CH" dirty="0" smtClean="0"/>
-              <a:t>SKOS</a:t>
-            </a:r>
-            <a:endParaRPr lang="de-CH" dirty="0"/>
-          </a:p>
-        </p:txBody>
-      </p:sp>
-      <p:sp>
-        <p:nvSpPr>
-          <p:cNvPr id="8" name="TextBox 7"/>
-          <p:cNvSpPr txBox="1"/>
-          <p:nvPr/>
-        </p:nvSpPr>
-        <p:spPr>
-          <a:xfrm>
-            <a:off x="7071862" y="5912900"/>
-            <a:ext cx="1279966" cy="369332"/>
-          </a:xfrm>
-          <a:prstGeom prst="rect">
-            <a:avLst/>
-          </a:prstGeom>
-          <a:noFill/>
-        </p:spPr>
-        <p:txBody>
-          <a:bodyPr wrap="none" rtlCol="0">
-            <a:spAutoFit/>
-          </a:bodyPr>
-          <a:lstStyle/>
-          <a:p>
-            <a:r>
-              <a:rPr lang="de-CH" dirty="0" smtClean="0"/>
-              <a:t>Linked Data</a:t>
-            </a:r>
-            <a:endParaRPr lang="de-CH" dirty="0"/>
-          </a:p>
-        </p:txBody>
-      </p:sp>
-      <p:sp>
-        <p:nvSpPr>
-          <p:cNvPr id="9" name="TextBox 8"/>
-          <p:cNvSpPr txBox="1"/>
-          <p:nvPr/>
-        </p:nvSpPr>
-        <p:spPr>
-          <a:xfrm>
-            <a:off x="8669881" y="6225137"/>
-            <a:ext cx="1535036" cy="369332"/>
-          </a:xfrm>
-          <a:prstGeom prst="rect">
-            <a:avLst/>
-          </a:prstGeom>
-          <a:noFill/>
-        </p:spPr>
-        <p:txBody>
-          <a:bodyPr wrap="none" rtlCol="0">
-            <a:spAutoFit/>
-          </a:bodyPr>
-          <a:lstStyle/>
-          <a:p>
-            <a:r>
-              <a:rPr lang="de-CH" dirty="0" smtClean="0"/>
-              <a:t>Semantic Web</a:t>
-            </a:r>
-            <a:endParaRPr lang="de-CH" dirty="0"/>
-          </a:p>
-        </p:txBody>
-      </p:sp>
     </p:spTree>
     <p:extLst>
       <p:ext uri="{BB962C8B-B14F-4D97-AF65-F5344CB8AC3E}">
@@ -5621,7 +6915,11 @@
           <a:p>
             <a:r>
               <a:rPr lang="de-CH" dirty="0" smtClean="0"/>
-              <a:t>Is the RoomTemperature of my LivingRoom dependent on the OutletTemperature of the SolarPanel?</a:t>
+              <a:t>Is the RoomTemperature of my LivingRoom dependent on the OutletTemperature of the </a:t>
+            </a:r>
+            <a:r>
+              <a:rPr lang="de-CH" dirty="0" smtClean="0"/>
+              <a:t>SolarWaterHeater?</a:t>
             </a:r>
             <a:endParaRPr lang="de-CH" dirty="0"/>
           </a:p>
@@ -6252,7 +7550,7 @@
           <a:graphicData uri="http://schemas.openxmlformats.org/presentationml/2006/ole">
             <mc:AlternateContent xmlns:mc="http://schemas.openxmlformats.org/markup-compatibility/2006">
               <mc:Choice xmlns:v="urn:schemas-microsoft-com:vml" Requires="v">
-                <p:oleObj spid="_x0000_s1033" name="Visio" r:id="rId3" imgW="3359310" imgH="2736894" progId="Visio.Drawing.15">
+                <p:oleObj spid="_x0000_s1036" name="Visio" r:id="rId3" imgW="3359310" imgH="2736894" progId="Visio.Drawing.15">
                   <p:embed/>
                 </p:oleObj>
               </mc:Choice>
@@ -10191,7 +11489,7 @@
         </p:spPr>
         <p:txBody>
           <a:bodyPr>
-            <a:normAutofit fontScale="90000"/>
+            <a:normAutofit/>
           </a:bodyPr>
           <a:lstStyle/>
           <a:p>
@@ -10206,17 +11504,7 @@
             <a:br>
               <a:rPr lang="en-GB" dirty="0" smtClean="0"/>
             </a:br>
-            <a:r>
-              <a:rPr lang="en-GB" dirty="0"/>
-              <a:t/>
-            </a:r>
-            <a:br>
-              <a:rPr lang="en-GB" dirty="0"/>
-            </a:br>
-            <a:r>
-              <a:rPr lang="en-GB" dirty="0"/>
-              <a:t>It won’t be easy, that is why I have always failed where others have succeeded.</a:t>
-            </a:r>
+            <a:endParaRPr lang="en-GB" dirty="0"/>
           </a:p>
         </p:txBody>
       </p:sp>
@@ -13250,7 +14538,7 @@
         <p:spPr>
           <a:xfrm>
             <a:off x="2092270" y="3258417"/>
-            <a:ext cx="6758004" cy="923330"/>
+            <a:ext cx="6705105" cy="923330"/>
           </a:xfrm>
           <a:prstGeom prst="rect">
             <a:avLst/>
@@ -13268,7 +14556,13 @@
           <a:lstStyle/>
           <a:p>
             <a:r>
-              <a:rPr lang="en-GB" dirty="0" err="1" smtClean="0"/>
+              <a:rPr lang="en-GB" dirty="0" err="1" smtClean="0">
+                <a:solidFill>
+                  <a:schemeClr val="accent2">
+                    <a:lumMod val="75000"/>
+                  </a:schemeClr>
+                </a:solidFill>
+              </a:rPr>
               <a:t>urn:Hubert-the-king</a:t>
             </a:r>
             <a:r>
@@ -13279,31 +14573,59 @@
               <a:rPr lang="en-GB" dirty="0" smtClean="0">
                 <a:hlinkClick r:id="rId2"/>
               </a:rPr>
-              <a:t>http://dbpedia.org/owns</a:t>
+              <a:t>http://</a:t>
+            </a:r>
+            <a:r>
+              <a:rPr lang="en-GB" dirty="0" smtClean="0">
+                <a:hlinkClick r:id="rId2"/>
+              </a:rPr>
+              <a:t>dbpedia.org/owns</a:t>
+            </a:r>
+            <a:r>
+              <a:rPr lang="en-GB" dirty="0"/>
+              <a:t> </a:t>
+            </a:r>
+            <a:r>
+              <a:rPr lang="en-GB" dirty="0">
+                <a:solidFill>
+                  <a:schemeClr val="accent6">
+                    <a:lumMod val="75000"/>
+                  </a:schemeClr>
+                </a:solidFill>
+              </a:rPr>
+              <a:t>http://ferrari.com/812</a:t>
+            </a:r>
+            <a:endParaRPr lang="en-GB" dirty="0" smtClean="0">
+              <a:solidFill>
+                <a:schemeClr val="accent6">
+                  <a:lumMod val="75000"/>
+                </a:schemeClr>
+              </a:solidFill>
+            </a:endParaRPr>
+          </a:p>
+          <a:p>
+            <a:r>
+              <a:rPr lang="en-GB" dirty="0" err="1" smtClean="0">
+                <a:solidFill>
+                  <a:schemeClr val="accent2">
+                    <a:lumMod val="75000"/>
+                  </a:schemeClr>
+                </a:solidFill>
+              </a:rPr>
+              <a:t>urn:Hubert-the-king</a:t>
             </a:r>
             <a:r>
               <a:rPr lang="en-GB" dirty="0" smtClean="0"/>
               <a:t>  </a:t>
             </a:r>
             <a:r>
-              <a:rPr lang="en-GB" dirty="0" smtClean="0">
-                <a:hlinkClick r:id="rId3"/>
-              </a:rPr>
-              <a:t>http://ferrari.com/812</a:t>
-            </a:r>
-            <a:endParaRPr lang="en-GB" dirty="0" smtClean="0"/>
-          </a:p>
-          <a:p>
-            <a:r>
-              <a:rPr lang="en-GB" dirty="0" err="1" smtClean="0"/>
-              <a:t>urn:Hubert-the-king</a:t>
-            </a:r>
-            <a:r>
-              <a:rPr lang="en-GB" dirty="0" smtClean="0"/>
-              <a:t>  </a:t>
-            </a:r>
-            <a:r>
-              <a:rPr lang="en-GB" dirty="0" err="1" smtClean="0"/>
+              <a:rPr lang="en-GB" dirty="0" err="1" smtClean="0">
+                <a:solidFill>
+                  <a:schemeClr val="accent1">
+                    <a:lumMod val="75000"/>
+                  </a:schemeClr>
+                </a:solidFill>
+              </a:rPr>
               <a:t>dbo:Royalty</a:t>
             </a:r>
             <a:r>
@@ -13311,7 +14633,13 @@
               <a:t> </a:t>
             </a:r>
             <a:r>
-              <a:rPr lang="en-GB" dirty="0" smtClean="0"/>
+              <a:rPr lang="en-GB" dirty="0" smtClean="0">
+                <a:solidFill>
+                  <a:schemeClr val="accent6">
+                    <a:lumMod val="75000"/>
+                  </a:schemeClr>
+                </a:solidFill>
+              </a:rPr>
               <a:t>wikidata:Q68277</a:t>
             </a:r>
           </a:p>
@@ -13397,7 +14725,7 @@
             <a:r>
               <a:rPr lang="en-GB" sz="1400" dirty="0" smtClean="0">
                 <a:latin typeface="+mj-lt"/>
-                <a:hlinkClick r:id="rId4"/>
+                <a:hlinkClick r:id="rId3"/>
               </a:rPr>
               <a:t>“https://dppedia.org/</a:t>
             </a:r>
@@ -13588,6 +14916,64 @@
           </a:p>
         </p:txBody>
       </p:sp>
+      <p:pic>
+        <p:nvPicPr>
+          <p:cNvPr id="3" name="Picture 2"/>
+          <p:cNvPicPr>
+            <a:picLocks noChangeAspect="1"/>
+          </p:cNvPicPr>
+          <p:nvPr/>
+        </p:nvPicPr>
+        <p:blipFill>
+          <a:blip r:embed="rId4"/>
+          <a:stretch>
+            <a:fillRect/>
+          </a:stretch>
+        </p:blipFill>
+        <p:spPr>
+          <a:xfrm>
+            <a:off x="5881271" y="1331600"/>
+            <a:ext cx="4619625" cy="4905375"/>
+          </a:xfrm>
+          <a:prstGeom prst="rect">
+            <a:avLst/>
+          </a:prstGeom>
+          <a:ln>
+            <a:solidFill>
+              <a:schemeClr val="tx1"/>
+            </a:solidFill>
+          </a:ln>
+        </p:spPr>
+      </p:pic>
+      <p:pic>
+        <p:nvPicPr>
+          <p:cNvPr id="5" name="Picture 4"/>
+          <p:cNvPicPr>
+            <a:picLocks noChangeAspect="1"/>
+          </p:cNvPicPr>
+          <p:nvPr/>
+        </p:nvPicPr>
+        <p:blipFill>
+          <a:blip r:embed="rId5"/>
+          <a:stretch>
+            <a:fillRect/>
+          </a:stretch>
+        </p:blipFill>
+        <p:spPr>
+          <a:xfrm>
+            <a:off x="7161813" y="3177369"/>
+            <a:ext cx="4667250" cy="3524250"/>
+          </a:xfrm>
+          <a:prstGeom prst="rect">
+            <a:avLst/>
+          </a:prstGeom>
+          <a:ln>
+            <a:solidFill>
+              <a:schemeClr val="tx1"/>
+            </a:solidFill>
+          </a:ln>
+        </p:spPr>
+      </p:pic>
     </p:spTree>
     <p:extLst>
       <p:ext uri="{BB962C8B-B14F-4D97-AF65-F5344CB8AC3E}">
@@ -13619,7 +15005,7 @@
                             </p:stCondLst>
                             <p:childTnLst>
                               <p:par>
-                                <p:cTn id="5" presetID="1" presetClass="entr" presetSubtype="0" fill="hold" grpId="0" nodeType="clickEffect">
+                                <p:cTn id="5" presetID="10" presetClass="entr" presetSubtype="0" fill="hold" grpId="0" nodeType="clickEffect">
                                   <p:stCondLst>
                                     <p:cond delay="0"/>
                                   </p:stCondLst>
@@ -13627,6 +15013,94 @@
                                     <p:set>
                                       <p:cBhvr>
                                         <p:cTn id="6" dur="1" fill="hold">
+                                          <p:stCondLst>
+                                            <p:cond delay="0"/>
+                                          </p:stCondLst>
+                                        </p:cTn>
+                                        <p:tgtEl>
+                                          <p:spTgt spid="12"/>
+                                        </p:tgtEl>
+                                        <p:attrNameLst>
+                                          <p:attrName>style.visibility</p:attrName>
+                                        </p:attrNameLst>
+                                      </p:cBhvr>
+                                      <p:to>
+                                        <p:strVal val="visible"/>
+                                      </p:to>
+                                    </p:set>
+                                    <p:animEffect transition="in" filter="fade">
+                                      <p:cBhvr>
+                                        <p:cTn id="7" dur="500"/>
+                                        <p:tgtEl>
+                                          <p:spTgt spid="12"/>
+                                        </p:tgtEl>
+                                      </p:cBhvr>
+                                    </p:animEffect>
+                                  </p:childTnLst>
+                                </p:cTn>
+                              </p:par>
+                              <p:par>
+                                <p:cTn id="8" presetID="10" presetClass="entr" presetSubtype="0" fill="hold" nodeType="withEffect">
+                                  <p:stCondLst>
+                                    <p:cond delay="0"/>
+                                  </p:stCondLst>
+                                  <p:childTnLst>
+                                    <p:set>
+                                      <p:cBhvr>
+                                        <p:cTn id="9" dur="1" fill="hold">
+                                          <p:stCondLst>
+                                            <p:cond delay="0"/>
+                                          </p:stCondLst>
+                                        </p:cTn>
+                                        <p:tgtEl>
+                                          <p:spTgt spid="13"/>
+                                        </p:tgtEl>
+                                        <p:attrNameLst>
+                                          <p:attrName>style.visibility</p:attrName>
+                                        </p:attrNameLst>
+                                      </p:cBhvr>
+                                      <p:to>
+                                        <p:strVal val="visible"/>
+                                      </p:to>
+                                    </p:set>
+                                    <p:animEffect transition="in" filter="fade">
+                                      <p:cBhvr>
+                                        <p:cTn id="10" dur="500"/>
+                                        <p:tgtEl>
+                                          <p:spTgt spid="13"/>
+                                        </p:tgtEl>
+                                      </p:cBhvr>
+                                    </p:animEffect>
+                                  </p:childTnLst>
+                                </p:cTn>
+                              </p:par>
+                            </p:childTnLst>
+                          </p:cTn>
+                        </p:par>
+                      </p:childTnLst>
+                    </p:cTn>
+                  </p:par>
+                  <p:par>
+                    <p:cTn id="11" fill="hold">
+                      <p:stCondLst>
+                        <p:cond delay="indefinite"/>
+                      </p:stCondLst>
+                      <p:childTnLst>
+                        <p:par>
+                          <p:cTn id="12" fill="hold">
+                            <p:stCondLst>
+                              <p:cond delay="0"/>
+                            </p:stCondLst>
+                            <p:childTnLst>
+                              <p:par>
+                                <p:cTn id="13" presetID="1" presetClass="entr" presetSubtype="0" fill="hold" grpId="0" nodeType="clickEffect">
+                                  <p:stCondLst>
+                                    <p:cond delay="0"/>
+                                  </p:stCondLst>
+                                  <p:childTnLst>
+                                    <p:set>
+                                      <p:cBhvr>
+                                        <p:cTn id="14" dur="1" fill="hold">
                                           <p:stCondLst>
                                             <p:cond delay="0"/>
                                           </p:stCondLst>
@@ -13652,26 +15126,26 @@
                     </p:cTn>
                   </p:par>
                   <p:par>
-                    <p:cTn id="7" fill="hold">
+                    <p:cTn id="15" fill="hold">
                       <p:stCondLst>
                         <p:cond delay="indefinite"/>
                       </p:stCondLst>
                       <p:childTnLst>
                         <p:par>
-                          <p:cTn id="8" fill="hold">
+                          <p:cTn id="16" fill="hold">
                             <p:stCondLst>
                               <p:cond delay="0"/>
                             </p:stCondLst>
                             <p:childTnLst>
                               <p:par>
-                                <p:cTn id="9" presetID="1" presetClass="entr" presetSubtype="0" fill="hold" grpId="0" nodeType="clickEffect">
+                                <p:cTn id="17" presetID="1" presetClass="entr" presetSubtype="0" fill="hold" grpId="0" nodeType="clickEffect">
                                   <p:stCondLst>
                                     <p:cond delay="0"/>
                                   </p:stCondLst>
                                   <p:childTnLst>
                                     <p:set>
                                       <p:cBhvr>
-                                        <p:cTn id="10" dur="1" fill="hold">
+                                        <p:cTn id="18" dur="1" fill="hold">
                                           <p:stCondLst>
                                             <p:cond delay="0"/>
                                           </p:stCondLst>
@@ -13687,6 +15161,112 @@
                                         <p:strVal val="visible"/>
                                       </p:to>
                                     </p:set>
+                                  </p:childTnLst>
+                                </p:cTn>
+                              </p:par>
+                            </p:childTnLst>
+                          </p:cTn>
+                        </p:par>
+                      </p:childTnLst>
+                    </p:cTn>
+                  </p:par>
+                  <p:par>
+                    <p:cTn id="19" fill="hold">
+                      <p:stCondLst>
+                        <p:cond delay="indefinite"/>
+                      </p:stCondLst>
+                      <p:childTnLst>
+                        <p:par>
+                          <p:cTn id="20" fill="hold">
+                            <p:stCondLst>
+                              <p:cond delay="0"/>
+                            </p:stCondLst>
+                            <p:childTnLst>
+                              <p:par>
+                                <p:cTn id="21" presetID="10" presetClass="entr" presetSubtype="0" fill="hold" nodeType="clickEffect">
+                                  <p:stCondLst>
+                                    <p:cond delay="0"/>
+                                  </p:stCondLst>
+                                  <p:childTnLst>
+                                    <p:set>
+                                      <p:cBhvr>
+                                        <p:cTn id="22" dur="1" fill="hold">
+                                          <p:stCondLst>
+                                            <p:cond delay="0"/>
+                                          </p:stCondLst>
+                                        </p:cTn>
+                                        <p:tgtEl>
+                                          <p:spTgt spid="3"/>
+                                        </p:tgtEl>
+                                        <p:attrNameLst>
+                                          <p:attrName>style.visibility</p:attrName>
+                                        </p:attrNameLst>
+                                      </p:cBhvr>
+                                      <p:to>
+                                        <p:strVal val="visible"/>
+                                      </p:to>
+                                    </p:set>
+                                    <p:animEffect transition="in" filter="fade">
+                                      <p:cBhvr>
+                                        <p:cTn id="23" dur="500"/>
+                                        <p:tgtEl>
+                                          <p:spTgt spid="3"/>
+                                        </p:tgtEl>
+                                      </p:cBhvr>
+                                    </p:animEffect>
+                                  </p:childTnLst>
+                                </p:cTn>
+                              </p:par>
+                            </p:childTnLst>
+                          </p:cTn>
+                        </p:par>
+                      </p:childTnLst>
+                    </p:cTn>
+                  </p:par>
+                  <p:par>
+                    <p:cTn id="24" fill="hold">
+                      <p:stCondLst>
+                        <p:cond delay="indefinite"/>
+                      </p:stCondLst>
+                      <p:childTnLst>
+                        <p:par>
+                          <p:cTn id="25" fill="hold">
+                            <p:stCondLst>
+                              <p:cond delay="0"/>
+                            </p:stCondLst>
+                            <p:childTnLst>
+                              <p:par>
+                                <p:cTn id="26" presetID="10" presetClass="entr" presetSubtype="0" fill="hold" nodeType="clickEffect">
+                                  <p:stCondLst>
+                                    <p:cond delay="0"/>
+                                  </p:stCondLst>
+                                  <p:childTnLst>
+                                    <p:set>
+                                      <p:cBhvr>
+                                        <p:cTn id="27" dur="1" fill="hold">
+                                          <p:stCondLst>
+                                            <p:cond delay="0"/>
+                                          </p:stCondLst>
+                                        </p:cTn>
+                                        <p:tgtEl>
+                                          <p:spTgt spid="5"/>
+                                        </p:tgtEl>
+                                        <p:attrNameLst>
+                                          <p:attrName>style.visibility</p:attrName>
+                                        </p:attrNameLst>
+                                      </p:cBhvr>
+                                      <p:to>
+                                        <p:strVal val="visible"/>
+                                      </p:to>
+                                    </p:set>
+                                    <p:animEffect transition="in" filter="fade">
+                                      <p:cBhvr>
+                                        <p:cTn id="28" dur="500"/>
+                                        <p:tgtEl>
+                                          <p:spTgt spid="5"/>
+                                        </p:tgtEl>
+                                      </p:cBhvr>
+                                    </p:animEffect>
                                   </p:childTnLst>
                                 </p:cTn>
                               </p:par>
@@ -13718,6 +15298,7 @@
       </p:par>
     </p:tnLst>
     <p:bldLst>
+      <p:bldP spid="12" grpId="0"/>
       <p:bldP spid="6" grpId="0" animBg="1"/>
       <p:bldP spid="7" grpId="0" animBg="1"/>
     </p:bldLst>
@@ -15182,9 +16763,273 @@
   <p:timing>
     <p:tnLst>
       <p:par>
-        <p:cTn id="1" dur="indefinite" restart="never" nodeType="tmRoot"/>
+        <p:cTn id="1" dur="indefinite" restart="never" nodeType="tmRoot">
+          <p:childTnLst>
+            <p:seq concurrent="1" nextAc="seek">
+              <p:cTn id="2" dur="indefinite" nodeType="mainSeq">
+                <p:childTnLst>
+                  <p:par>
+                    <p:cTn id="3" fill="hold">
+                      <p:stCondLst>
+                        <p:cond delay="indefinite"/>
+                      </p:stCondLst>
+                      <p:childTnLst>
+                        <p:par>
+                          <p:cTn id="4" fill="hold">
+                            <p:stCondLst>
+                              <p:cond delay="0"/>
+                            </p:stCondLst>
+                            <p:childTnLst>
+                              <p:par>
+                                <p:cTn id="5" presetID="1" presetClass="entr" presetSubtype="0" fill="hold" grpId="0" nodeType="clickEffect">
+                                  <p:stCondLst>
+                                    <p:cond delay="0"/>
+                                  </p:stCondLst>
+                                  <p:childTnLst>
+                                    <p:set>
+                                      <p:cBhvr>
+                                        <p:cTn id="6" dur="1" fill="hold">
+                                          <p:stCondLst>
+                                            <p:cond delay="0"/>
+                                          </p:stCondLst>
+                                        </p:cTn>
+                                        <p:tgtEl>
+                                          <p:spTgt spid="24"/>
+                                        </p:tgtEl>
+                                        <p:attrNameLst>
+                                          <p:attrName>style.visibility</p:attrName>
+                                        </p:attrNameLst>
+                                      </p:cBhvr>
+                                      <p:to>
+                                        <p:strVal val="visible"/>
+                                      </p:to>
+                                    </p:set>
+                                  </p:childTnLst>
+                                </p:cTn>
+                              </p:par>
+                            </p:childTnLst>
+                          </p:cTn>
+                        </p:par>
+                      </p:childTnLst>
+                    </p:cTn>
+                  </p:par>
+                  <p:par>
+                    <p:cTn id="7" fill="hold">
+                      <p:stCondLst>
+                        <p:cond delay="indefinite"/>
+                      </p:stCondLst>
+                      <p:childTnLst>
+                        <p:par>
+                          <p:cTn id="8" fill="hold">
+                            <p:stCondLst>
+                              <p:cond delay="0"/>
+                            </p:stCondLst>
+                            <p:childTnLst>
+                              <p:par>
+                                <p:cTn id="9" presetID="1" presetClass="entr" presetSubtype="0" fill="hold" grpId="0" nodeType="clickEffect">
+                                  <p:stCondLst>
+                                    <p:cond delay="0"/>
+                                  </p:stCondLst>
+                                  <p:childTnLst>
+                                    <p:set>
+                                      <p:cBhvr>
+                                        <p:cTn id="10" dur="1" fill="hold">
+                                          <p:stCondLst>
+                                            <p:cond delay="0"/>
+                                          </p:stCondLst>
+                                        </p:cTn>
+                                        <p:tgtEl>
+                                          <p:spTgt spid="9"/>
+                                        </p:tgtEl>
+                                        <p:attrNameLst>
+                                          <p:attrName>style.visibility</p:attrName>
+                                        </p:attrNameLst>
+                                      </p:cBhvr>
+                                      <p:to>
+                                        <p:strVal val="visible"/>
+                                      </p:to>
+                                    </p:set>
+                                  </p:childTnLst>
+                                </p:cTn>
+                              </p:par>
+                            </p:childTnLst>
+                          </p:cTn>
+                        </p:par>
+                      </p:childTnLst>
+                    </p:cTn>
+                  </p:par>
+                  <p:par>
+                    <p:cTn id="11" fill="hold">
+                      <p:stCondLst>
+                        <p:cond delay="indefinite"/>
+                      </p:stCondLst>
+                      <p:childTnLst>
+                        <p:par>
+                          <p:cTn id="12" fill="hold">
+                            <p:stCondLst>
+                              <p:cond delay="0"/>
+                            </p:stCondLst>
+                            <p:childTnLst>
+                              <p:par>
+                                <p:cTn id="13" presetID="1" presetClass="entr" presetSubtype="0" fill="hold" grpId="0" nodeType="clickEffect">
+                                  <p:stCondLst>
+                                    <p:cond delay="0"/>
+                                  </p:stCondLst>
+                                  <p:childTnLst>
+                                    <p:set>
+                                      <p:cBhvr>
+                                        <p:cTn id="14" dur="1" fill="hold">
+                                          <p:stCondLst>
+                                            <p:cond delay="0"/>
+                                          </p:stCondLst>
+                                        </p:cTn>
+                                        <p:tgtEl>
+                                          <p:spTgt spid="26"/>
+                                        </p:tgtEl>
+                                        <p:attrNameLst>
+                                          <p:attrName>style.visibility</p:attrName>
+                                        </p:attrNameLst>
+                                      </p:cBhvr>
+                                      <p:to>
+                                        <p:strVal val="visible"/>
+                                      </p:to>
+                                    </p:set>
+                                  </p:childTnLst>
+                                </p:cTn>
+                              </p:par>
+                              <p:par>
+                                <p:cTn id="15" presetID="1" presetClass="entr" presetSubtype="0" fill="hold" grpId="0" nodeType="withEffect">
+                                  <p:stCondLst>
+                                    <p:cond delay="0"/>
+                                  </p:stCondLst>
+                                  <p:childTnLst>
+                                    <p:set>
+                                      <p:cBhvr>
+                                        <p:cTn id="16" dur="1" fill="hold">
+                                          <p:stCondLst>
+                                            <p:cond delay="0"/>
+                                          </p:stCondLst>
+                                        </p:cTn>
+                                        <p:tgtEl>
+                                          <p:spTgt spid="27"/>
+                                        </p:tgtEl>
+                                        <p:attrNameLst>
+                                          <p:attrName>style.visibility</p:attrName>
+                                        </p:attrNameLst>
+                                      </p:cBhvr>
+                                      <p:to>
+                                        <p:strVal val="visible"/>
+                                      </p:to>
+                                    </p:set>
+                                  </p:childTnLst>
+                                </p:cTn>
+                              </p:par>
+                              <p:par>
+                                <p:cTn id="17" presetID="1" presetClass="entr" presetSubtype="0" fill="hold" nodeType="withEffect">
+                                  <p:stCondLst>
+                                    <p:cond delay="0"/>
+                                  </p:stCondLst>
+                                  <p:childTnLst>
+                                    <p:set>
+                                      <p:cBhvr>
+                                        <p:cTn id="18" dur="1" fill="hold">
+                                          <p:stCondLst>
+                                            <p:cond delay="0"/>
+                                          </p:stCondLst>
+                                        </p:cTn>
+                                        <p:tgtEl>
+                                          <p:spTgt spid="25"/>
+                                        </p:tgtEl>
+                                        <p:attrNameLst>
+                                          <p:attrName>style.visibility</p:attrName>
+                                        </p:attrNameLst>
+                                      </p:cBhvr>
+                                      <p:to>
+                                        <p:strVal val="visible"/>
+                                      </p:to>
+                                    </p:set>
+                                  </p:childTnLst>
+                                </p:cTn>
+                              </p:par>
+                            </p:childTnLst>
+                          </p:cTn>
+                        </p:par>
+                      </p:childTnLst>
+                    </p:cTn>
+                  </p:par>
+                  <p:par>
+                    <p:cTn id="19" fill="hold">
+                      <p:stCondLst>
+                        <p:cond delay="indefinite"/>
+                      </p:stCondLst>
+                      <p:childTnLst>
+                        <p:par>
+                          <p:cTn id="20" fill="hold">
+                            <p:stCondLst>
+                              <p:cond delay="0"/>
+                            </p:stCondLst>
+                            <p:childTnLst>
+                              <p:par>
+                                <p:cTn id="21" presetID="1" presetClass="entr" presetSubtype="0" fill="hold" grpId="0" nodeType="clickEffect">
+                                  <p:stCondLst>
+                                    <p:cond delay="0"/>
+                                  </p:stCondLst>
+                                  <p:childTnLst>
+                                    <p:set>
+                                      <p:cBhvr>
+                                        <p:cTn id="22" dur="1" fill="hold">
+                                          <p:stCondLst>
+                                            <p:cond delay="0"/>
+                                          </p:stCondLst>
+                                        </p:cTn>
+                                        <p:tgtEl>
+                                          <p:spTgt spid="30"/>
+                                        </p:tgtEl>
+                                        <p:attrNameLst>
+                                          <p:attrName>style.visibility</p:attrName>
+                                        </p:attrNameLst>
+                                      </p:cBhvr>
+                                      <p:to>
+                                        <p:strVal val="visible"/>
+                                      </p:to>
+                                    </p:set>
+                                  </p:childTnLst>
+                                </p:cTn>
+                              </p:par>
+                            </p:childTnLst>
+                          </p:cTn>
+                        </p:par>
+                      </p:childTnLst>
+                    </p:cTn>
+                  </p:par>
+                </p:childTnLst>
+              </p:cTn>
+              <p:prevCondLst>
+                <p:cond evt="onPrev" delay="0">
+                  <p:tgtEl>
+                    <p:sldTgt/>
+                  </p:tgtEl>
+                </p:cond>
+              </p:prevCondLst>
+              <p:nextCondLst>
+                <p:cond evt="onNext" delay="0">
+                  <p:tgtEl>
+                    <p:sldTgt/>
+                  </p:tgtEl>
+                </p:cond>
+              </p:nextCondLst>
+            </p:seq>
+          </p:childTnLst>
+        </p:cTn>
       </p:par>
     </p:tnLst>
+    <p:bldLst>
+      <p:bldP spid="24" grpId="0"/>
+      <p:bldP spid="27" grpId="0"/>
+      <p:bldP spid="9" grpId="0" animBg="1"/>
+      <p:bldP spid="30" grpId="0" animBg="1"/>
+      <p:bldP spid="26" grpId="0" animBg="1"/>
+    </p:bldLst>
   </p:timing>
 </p:sld>
 </file>
@@ -16459,9 +18304,281 @@
   <p:timing>
     <p:tnLst>
       <p:par>
-        <p:cTn id="1" dur="indefinite" restart="never" nodeType="tmRoot"/>
+        <p:cTn id="1" dur="indefinite" restart="never" nodeType="tmRoot">
+          <p:childTnLst>
+            <p:seq concurrent="1" nextAc="seek">
+              <p:cTn id="2" dur="indefinite" nodeType="mainSeq">
+                <p:childTnLst>
+                  <p:par>
+                    <p:cTn id="3" fill="hold">
+                      <p:stCondLst>
+                        <p:cond delay="indefinite"/>
+                      </p:stCondLst>
+                      <p:childTnLst>
+                        <p:par>
+                          <p:cTn id="4" fill="hold">
+                            <p:stCondLst>
+                              <p:cond delay="0"/>
+                            </p:stCondLst>
+                            <p:childTnLst>
+                              <p:par>
+                                <p:cTn id="5" presetID="1" presetClass="entr" presetSubtype="0" fill="hold" nodeType="clickEffect">
+                                  <p:stCondLst>
+                                    <p:cond delay="0"/>
+                                  </p:stCondLst>
+                                  <p:childTnLst>
+                                    <p:set>
+                                      <p:cBhvr>
+                                        <p:cTn id="6" dur="1" fill="hold">
+                                          <p:stCondLst>
+                                            <p:cond delay="0"/>
+                                          </p:stCondLst>
+                                        </p:cTn>
+                                        <p:tgtEl>
+                                          <p:spTgt spid="45"/>
+                                        </p:tgtEl>
+                                        <p:attrNameLst>
+                                          <p:attrName>style.visibility</p:attrName>
+                                        </p:attrNameLst>
+                                      </p:cBhvr>
+                                      <p:to>
+                                        <p:strVal val="visible"/>
+                                      </p:to>
+                                    </p:set>
+                                  </p:childTnLst>
+                                </p:cTn>
+                              </p:par>
+                              <p:par>
+                                <p:cTn id="7" presetID="1" presetClass="entr" presetSubtype="0" fill="hold" grpId="0" nodeType="withEffect">
+                                  <p:stCondLst>
+                                    <p:cond delay="0"/>
+                                  </p:stCondLst>
+                                  <p:childTnLst>
+                                    <p:set>
+                                      <p:cBhvr>
+                                        <p:cTn id="8" dur="1" fill="hold">
+                                          <p:stCondLst>
+                                            <p:cond delay="0"/>
+                                          </p:stCondLst>
+                                        </p:cTn>
+                                        <p:tgtEl>
+                                          <p:spTgt spid="48"/>
+                                        </p:tgtEl>
+                                        <p:attrNameLst>
+                                          <p:attrName>style.visibility</p:attrName>
+                                        </p:attrNameLst>
+                                      </p:cBhvr>
+                                      <p:to>
+                                        <p:strVal val="visible"/>
+                                      </p:to>
+                                    </p:set>
+                                  </p:childTnLst>
+                                </p:cTn>
+                              </p:par>
+                            </p:childTnLst>
+                          </p:cTn>
+                        </p:par>
+                      </p:childTnLst>
+                    </p:cTn>
+                  </p:par>
+                  <p:par>
+                    <p:cTn id="9" fill="hold">
+                      <p:stCondLst>
+                        <p:cond delay="indefinite"/>
+                      </p:stCondLst>
+                      <p:childTnLst>
+                        <p:par>
+                          <p:cTn id="10" fill="hold">
+                            <p:stCondLst>
+                              <p:cond delay="0"/>
+                            </p:stCondLst>
+                            <p:childTnLst>
+                              <p:par>
+                                <p:cTn id="11" presetID="1" presetClass="entr" presetSubtype="0" fill="hold" grpId="0" nodeType="clickEffect">
+                                  <p:stCondLst>
+                                    <p:cond delay="0"/>
+                                  </p:stCondLst>
+                                  <p:childTnLst>
+                                    <p:set>
+                                      <p:cBhvr>
+                                        <p:cTn id="12" dur="1" fill="hold">
+                                          <p:stCondLst>
+                                            <p:cond delay="0"/>
+                                          </p:stCondLst>
+                                        </p:cTn>
+                                        <p:tgtEl>
+                                          <p:spTgt spid="49"/>
+                                        </p:tgtEl>
+                                        <p:attrNameLst>
+                                          <p:attrName>style.visibility</p:attrName>
+                                        </p:attrNameLst>
+                                      </p:cBhvr>
+                                      <p:to>
+                                        <p:strVal val="visible"/>
+                                      </p:to>
+                                    </p:set>
+                                  </p:childTnLst>
+                                </p:cTn>
+                              </p:par>
+                              <p:par>
+                                <p:cTn id="13" presetID="1" presetClass="entr" presetSubtype="0" fill="hold" nodeType="withEffect">
+                                  <p:stCondLst>
+                                    <p:cond delay="0"/>
+                                  </p:stCondLst>
+                                  <p:childTnLst>
+                                    <p:set>
+                                      <p:cBhvr>
+                                        <p:cTn id="14" dur="1" fill="hold">
+                                          <p:stCondLst>
+                                            <p:cond delay="0"/>
+                                          </p:stCondLst>
+                                        </p:cTn>
+                                        <p:tgtEl>
+                                          <p:spTgt spid="47"/>
+                                        </p:tgtEl>
+                                        <p:attrNameLst>
+                                          <p:attrName>style.visibility</p:attrName>
+                                        </p:attrNameLst>
+                                      </p:cBhvr>
+                                      <p:to>
+                                        <p:strVal val="visible"/>
+                                      </p:to>
+                                    </p:set>
+                                  </p:childTnLst>
+                                </p:cTn>
+                              </p:par>
+                            </p:childTnLst>
+                          </p:cTn>
+                        </p:par>
+                      </p:childTnLst>
+                    </p:cTn>
+                  </p:par>
+                  <p:par>
+                    <p:cTn id="15" fill="hold">
+                      <p:stCondLst>
+                        <p:cond delay="indefinite"/>
+                      </p:stCondLst>
+                      <p:childTnLst>
+                        <p:par>
+                          <p:cTn id="16" fill="hold">
+                            <p:stCondLst>
+                              <p:cond delay="0"/>
+                            </p:stCondLst>
+                            <p:childTnLst>
+                              <p:par>
+                                <p:cTn id="17" presetID="1" presetClass="entr" presetSubtype="0" fill="hold" grpId="0" nodeType="clickEffect">
+                                  <p:stCondLst>
+                                    <p:cond delay="0"/>
+                                  </p:stCondLst>
+                                  <p:childTnLst>
+                                    <p:set>
+                                      <p:cBhvr>
+                                        <p:cTn id="18" dur="1" fill="hold">
+                                          <p:stCondLst>
+                                            <p:cond delay="0"/>
+                                          </p:stCondLst>
+                                        </p:cTn>
+                                        <p:tgtEl>
+                                          <p:spTgt spid="54"/>
+                                        </p:tgtEl>
+                                        <p:attrNameLst>
+                                          <p:attrName>style.visibility</p:attrName>
+                                        </p:attrNameLst>
+                                      </p:cBhvr>
+                                      <p:to>
+                                        <p:strVal val="visible"/>
+                                      </p:to>
+                                    </p:set>
+                                  </p:childTnLst>
+                                </p:cTn>
+                              </p:par>
+                              <p:par>
+                                <p:cTn id="19" presetID="1" presetClass="entr" presetSubtype="0" fill="hold" grpId="0" nodeType="withEffect">
+                                  <p:stCondLst>
+                                    <p:cond delay="0"/>
+                                  </p:stCondLst>
+                                  <p:childTnLst>
+                                    <p:set>
+                                      <p:cBhvr>
+                                        <p:cTn id="20" dur="1" fill="hold">
+                                          <p:stCondLst>
+                                            <p:cond delay="0"/>
+                                          </p:stCondLst>
+                                        </p:cTn>
+                                        <p:tgtEl>
+                                          <p:spTgt spid="57"/>
+                                        </p:tgtEl>
+                                        <p:attrNameLst>
+                                          <p:attrName>style.visibility</p:attrName>
+                                        </p:attrNameLst>
+                                      </p:cBhvr>
+                                      <p:to>
+                                        <p:strVal val="visible"/>
+                                      </p:to>
+                                    </p:set>
+                                  </p:childTnLst>
+                                </p:cTn>
+                              </p:par>
+                              <p:par>
+                                <p:cTn id="21" presetID="1" presetClass="entr" presetSubtype="0" fill="hold" nodeType="withEffect">
+                                  <p:stCondLst>
+                                    <p:cond delay="0"/>
+                                  </p:stCondLst>
+                                  <p:childTnLst>
+                                    <p:set>
+                                      <p:cBhvr>
+                                        <p:cTn id="22" dur="1" fill="hold">
+                                          <p:stCondLst>
+                                            <p:cond delay="0"/>
+                                          </p:stCondLst>
+                                        </p:cTn>
+                                        <p:tgtEl>
+                                          <p:spTgt spid="55"/>
+                                        </p:tgtEl>
+                                        <p:attrNameLst>
+                                          <p:attrName>style.visibility</p:attrName>
+                                        </p:attrNameLst>
+                                      </p:cBhvr>
+                                      <p:to>
+                                        <p:strVal val="visible"/>
+                                      </p:to>
+                                    </p:set>
+                                  </p:childTnLst>
+                                </p:cTn>
+                              </p:par>
+                            </p:childTnLst>
+                          </p:cTn>
+                        </p:par>
+                      </p:childTnLst>
+                    </p:cTn>
+                  </p:par>
+                </p:childTnLst>
+              </p:cTn>
+              <p:prevCondLst>
+                <p:cond evt="onPrev" delay="0">
+                  <p:tgtEl>
+                    <p:sldTgt/>
+                  </p:tgtEl>
+                </p:cond>
+              </p:prevCondLst>
+              <p:nextCondLst>
+                <p:cond evt="onNext" delay="0">
+                  <p:tgtEl>
+                    <p:sldTgt/>
+                  </p:tgtEl>
+                </p:cond>
+              </p:nextCondLst>
+            </p:seq>
+          </p:childTnLst>
+        </p:cTn>
       </p:par>
     </p:tnLst>
+    <p:bldLst>
+      <p:bldP spid="48" grpId="0"/>
+      <p:bldP spid="49" grpId="0"/>
+      <p:bldP spid="54" grpId="0" animBg="1"/>
+      <p:bldP spid="57" grpId="0"/>
+    </p:bldLst>
   </p:timing>
 </p:sld>
 </file>
@@ -17791,9 +19908,374 @@
   <p:timing>
     <p:tnLst>
       <p:par>
-        <p:cTn id="1" dur="indefinite" restart="never" nodeType="tmRoot"/>
+        <p:cTn id="1" dur="indefinite" restart="never" nodeType="tmRoot">
+          <p:childTnLst>
+            <p:seq concurrent="1" nextAc="seek">
+              <p:cTn id="2" dur="indefinite" nodeType="mainSeq">
+                <p:childTnLst>
+                  <p:par>
+                    <p:cTn id="3" fill="hold">
+                      <p:stCondLst>
+                        <p:cond delay="indefinite"/>
+                      </p:stCondLst>
+                      <p:childTnLst>
+                        <p:par>
+                          <p:cTn id="4" fill="hold">
+                            <p:stCondLst>
+                              <p:cond delay="0"/>
+                            </p:stCondLst>
+                            <p:childTnLst>
+                              <p:par>
+                                <p:cTn id="5" presetID="1" presetClass="entr" presetSubtype="0" fill="hold" grpId="0" nodeType="clickEffect">
+                                  <p:stCondLst>
+                                    <p:cond delay="0"/>
+                                  </p:stCondLst>
+                                  <p:childTnLst>
+                                    <p:set>
+                                      <p:cBhvr>
+                                        <p:cTn id="6" dur="1" fill="hold">
+                                          <p:stCondLst>
+                                            <p:cond delay="0"/>
+                                          </p:stCondLst>
+                                        </p:cTn>
+                                        <p:tgtEl>
+                                          <p:spTgt spid="39"/>
+                                        </p:tgtEl>
+                                        <p:attrNameLst>
+                                          <p:attrName>style.visibility</p:attrName>
+                                        </p:attrNameLst>
+                                      </p:cBhvr>
+                                      <p:to>
+                                        <p:strVal val="visible"/>
+                                      </p:to>
+                                    </p:set>
+                                  </p:childTnLst>
+                                </p:cTn>
+                              </p:par>
+                              <p:par>
+                                <p:cTn id="7" presetID="1" presetClass="entr" presetSubtype="0" fill="hold" grpId="0" nodeType="withEffect">
+                                  <p:stCondLst>
+                                    <p:cond delay="0"/>
+                                  </p:stCondLst>
+                                  <p:childTnLst>
+                                    <p:set>
+                                      <p:cBhvr>
+                                        <p:cTn id="8" dur="1" fill="hold">
+                                          <p:stCondLst>
+                                            <p:cond delay="0"/>
+                                          </p:stCondLst>
+                                        </p:cTn>
+                                        <p:tgtEl>
+                                          <p:spTgt spid="38"/>
+                                        </p:tgtEl>
+                                        <p:attrNameLst>
+                                          <p:attrName>style.visibility</p:attrName>
+                                        </p:attrNameLst>
+                                      </p:cBhvr>
+                                      <p:to>
+                                        <p:strVal val="visible"/>
+                                      </p:to>
+                                    </p:set>
+                                  </p:childTnLst>
+                                </p:cTn>
+                              </p:par>
+                              <p:par>
+                                <p:cTn id="9" presetID="1" presetClass="entr" presetSubtype="0" fill="hold" grpId="0" nodeType="withEffect">
+                                  <p:stCondLst>
+                                    <p:cond delay="0"/>
+                                  </p:stCondLst>
+                                  <p:childTnLst>
+                                    <p:set>
+                                      <p:cBhvr>
+                                        <p:cTn id="10" dur="1" fill="hold">
+                                          <p:stCondLst>
+                                            <p:cond delay="0"/>
+                                          </p:stCondLst>
+                                        </p:cTn>
+                                        <p:tgtEl>
+                                          <p:spTgt spid="52"/>
+                                        </p:tgtEl>
+                                        <p:attrNameLst>
+                                          <p:attrName>style.visibility</p:attrName>
+                                        </p:attrNameLst>
+                                      </p:cBhvr>
+                                      <p:to>
+                                        <p:strVal val="visible"/>
+                                      </p:to>
+                                    </p:set>
+                                  </p:childTnLst>
+                                </p:cTn>
+                              </p:par>
+                              <p:par>
+                                <p:cTn id="11" presetID="1" presetClass="entr" presetSubtype="0" fill="hold" nodeType="withEffect">
+                                  <p:stCondLst>
+                                    <p:cond delay="0"/>
+                                  </p:stCondLst>
+                                  <p:childTnLst>
+                                    <p:set>
+                                      <p:cBhvr>
+                                        <p:cTn id="12" dur="1" fill="hold">
+                                          <p:stCondLst>
+                                            <p:cond delay="0"/>
+                                          </p:stCondLst>
+                                        </p:cTn>
+                                        <p:tgtEl>
+                                          <p:spTgt spid="46"/>
+                                        </p:tgtEl>
+                                        <p:attrNameLst>
+                                          <p:attrName>style.visibility</p:attrName>
+                                        </p:attrNameLst>
+                                      </p:cBhvr>
+                                      <p:to>
+                                        <p:strVal val="visible"/>
+                                      </p:to>
+                                    </p:set>
+                                  </p:childTnLst>
+                                </p:cTn>
+                              </p:par>
+                            </p:childTnLst>
+                          </p:cTn>
+                        </p:par>
+                      </p:childTnLst>
+                    </p:cTn>
+                  </p:par>
+                  <p:par>
+                    <p:cTn id="13" fill="hold">
+                      <p:stCondLst>
+                        <p:cond delay="indefinite"/>
+                      </p:stCondLst>
+                      <p:childTnLst>
+                        <p:par>
+                          <p:cTn id="14" fill="hold">
+                            <p:stCondLst>
+                              <p:cond delay="0"/>
+                            </p:stCondLst>
+                            <p:childTnLst>
+                              <p:par>
+                                <p:cTn id="15" presetID="1" presetClass="entr" presetSubtype="0" fill="hold" grpId="0" nodeType="clickEffect">
+                                  <p:stCondLst>
+                                    <p:cond delay="0"/>
+                                  </p:stCondLst>
+                                  <p:childTnLst>
+                                    <p:set>
+                                      <p:cBhvr>
+                                        <p:cTn id="16" dur="1" fill="hold">
+                                          <p:stCondLst>
+                                            <p:cond delay="0"/>
+                                          </p:stCondLst>
+                                        </p:cTn>
+                                        <p:tgtEl>
+                                          <p:spTgt spid="59"/>
+                                        </p:tgtEl>
+                                        <p:attrNameLst>
+                                          <p:attrName>style.visibility</p:attrName>
+                                        </p:attrNameLst>
+                                      </p:cBhvr>
+                                      <p:to>
+                                        <p:strVal val="visible"/>
+                                      </p:to>
+                                    </p:set>
+                                  </p:childTnLst>
+                                </p:cTn>
+                              </p:par>
+                              <p:par>
+                                <p:cTn id="17" presetID="1" presetClass="entr" presetSubtype="0" fill="hold" nodeType="withEffect">
+                                  <p:stCondLst>
+                                    <p:cond delay="0"/>
+                                  </p:stCondLst>
+                                  <p:childTnLst>
+                                    <p:set>
+                                      <p:cBhvr>
+                                        <p:cTn id="18" dur="1" fill="hold">
+                                          <p:stCondLst>
+                                            <p:cond delay="0"/>
+                                          </p:stCondLst>
+                                        </p:cTn>
+                                        <p:tgtEl>
+                                          <p:spTgt spid="58"/>
+                                        </p:tgtEl>
+                                        <p:attrNameLst>
+                                          <p:attrName>style.visibility</p:attrName>
+                                        </p:attrNameLst>
+                                      </p:cBhvr>
+                                      <p:to>
+                                        <p:strVal val="visible"/>
+                                      </p:to>
+                                    </p:set>
+                                  </p:childTnLst>
+                                </p:cTn>
+                              </p:par>
+                              <p:par>
+                                <p:cTn id="19" presetID="1" presetClass="entr" presetSubtype="0" fill="hold" grpId="0" nodeType="withEffect">
+                                  <p:stCondLst>
+                                    <p:cond delay="0"/>
+                                  </p:stCondLst>
+                                  <p:childTnLst>
+                                    <p:set>
+                                      <p:cBhvr>
+                                        <p:cTn id="20" dur="1" fill="hold">
+                                          <p:stCondLst>
+                                            <p:cond delay="0"/>
+                                          </p:stCondLst>
+                                        </p:cTn>
+                                        <p:tgtEl>
+                                          <p:spTgt spid="56"/>
+                                        </p:tgtEl>
+                                        <p:attrNameLst>
+                                          <p:attrName>style.visibility</p:attrName>
+                                        </p:attrNameLst>
+                                      </p:cBhvr>
+                                      <p:to>
+                                        <p:strVal val="visible"/>
+                                      </p:to>
+                                    </p:set>
+                                  </p:childTnLst>
+                                </p:cTn>
+                              </p:par>
+                              <p:par>
+                                <p:cTn id="21" presetID="1" presetClass="entr" presetSubtype="0" fill="hold" nodeType="withEffect">
+                                  <p:stCondLst>
+                                    <p:cond delay="0"/>
+                                  </p:stCondLst>
+                                  <p:childTnLst>
+                                    <p:set>
+                                      <p:cBhvr>
+                                        <p:cTn id="22" dur="1" fill="hold">
+                                          <p:stCondLst>
+                                            <p:cond delay="0"/>
+                                          </p:stCondLst>
+                                        </p:cTn>
+                                        <p:tgtEl>
+                                          <p:spTgt spid="61"/>
+                                        </p:tgtEl>
+                                        <p:attrNameLst>
+                                          <p:attrName>style.visibility</p:attrName>
+                                        </p:attrNameLst>
+                                      </p:cBhvr>
+                                      <p:to>
+                                        <p:strVal val="visible"/>
+                                      </p:to>
+                                    </p:set>
+                                  </p:childTnLst>
+                                </p:cTn>
+                              </p:par>
+                              <p:par>
+                                <p:cTn id="23" presetID="1" presetClass="entr" presetSubtype="0" fill="hold" grpId="0" nodeType="withEffect">
+                                  <p:stCondLst>
+                                    <p:cond delay="0"/>
+                                  </p:stCondLst>
+                                  <p:childTnLst>
+                                    <p:set>
+                                      <p:cBhvr>
+                                        <p:cTn id="24" dur="1" fill="hold">
+                                          <p:stCondLst>
+                                            <p:cond delay="0"/>
+                                          </p:stCondLst>
+                                        </p:cTn>
+                                        <p:tgtEl>
+                                          <p:spTgt spid="62"/>
+                                        </p:tgtEl>
+                                        <p:attrNameLst>
+                                          <p:attrName>style.visibility</p:attrName>
+                                        </p:attrNameLst>
+                                      </p:cBhvr>
+                                      <p:to>
+                                        <p:strVal val="visible"/>
+                                      </p:to>
+                                    </p:set>
+                                  </p:childTnLst>
+                                </p:cTn>
+                              </p:par>
+                              <p:par>
+                                <p:cTn id="25" presetID="1" presetClass="entr" presetSubtype="0" fill="hold" grpId="0" nodeType="withEffect">
+                                  <p:stCondLst>
+                                    <p:cond delay="0"/>
+                                  </p:stCondLst>
+                                  <p:childTnLst>
+                                    <p:set>
+                                      <p:cBhvr>
+                                        <p:cTn id="26" dur="1" fill="hold">
+                                          <p:stCondLst>
+                                            <p:cond delay="0"/>
+                                          </p:stCondLst>
+                                        </p:cTn>
+                                        <p:tgtEl>
+                                          <p:spTgt spid="60"/>
+                                        </p:tgtEl>
+                                        <p:attrNameLst>
+                                          <p:attrName>style.visibility</p:attrName>
+                                        </p:attrNameLst>
+                                      </p:cBhvr>
+                                      <p:to>
+                                        <p:strVal val="visible"/>
+                                      </p:to>
+                                    </p:set>
+                                  </p:childTnLst>
+                                </p:cTn>
+                              </p:par>
+                              <p:par>
+                                <p:cTn id="27" presetID="1" presetClass="entr" presetSubtype="0" fill="hold" nodeType="withEffect">
+                                  <p:stCondLst>
+                                    <p:cond delay="0"/>
+                                  </p:stCondLst>
+                                  <p:childTnLst>
+                                    <p:set>
+                                      <p:cBhvr>
+                                        <p:cTn id="28" dur="1" fill="hold">
+                                          <p:stCondLst>
+                                            <p:cond delay="0"/>
+                                          </p:stCondLst>
+                                        </p:cTn>
+                                        <p:tgtEl>
+                                          <p:spTgt spid="53"/>
+                                        </p:tgtEl>
+                                        <p:attrNameLst>
+                                          <p:attrName>style.visibility</p:attrName>
+                                        </p:attrNameLst>
+                                      </p:cBhvr>
+                                      <p:to>
+                                        <p:strVal val="visible"/>
+                                      </p:to>
+                                    </p:set>
+                                  </p:childTnLst>
+                                </p:cTn>
+                              </p:par>
+                            </p:childTnLst>
+                          </p:cTn>
+                        </p:par>
+                      </p:childTnLst>
+                    </p:cTn>
+                  </p:par>
+                </p:childTnLst>
+              </p:cTn>
+              <p:prevCondLst>
+                <p:cond evt="onPrev" delay="0">
+                  <p:tgtEl>
+                    <p:sldTgt/>
+                  </p:tgtEl>
+                </p:cond>
+              </p:prevCondLst>
+              <p:nextCondLst>
+                <p:cond evt="onNext" delay="0">
+                  <p:tgtEl>
+                    <p:sldTgt/>
+                  </p:tgtEl>
+                </p:cond>
+              </p:nextCondLst>
+            </p:seq>
+          </p:childTnLst>
+        </p:cTn>
       </p:par>
     </p:tnLst>
+    <p:bldLst>
+      <p:bldP spid="38" grpId="0" animBg="1"/>
+      <p:bldP spid="39" grpId="0"/>
+      <p:bldP spid="52" grpId="0"/>
+      <p:bldP spid="56" grpId="0" animBg="1"/>
+      <p:bldP spid="59" grpId="0"/>
+      <p:bldP spid="60" grpId="0" animBg="1"/>
+      <p:bldP spid="62" grpId="0"/>
+    </p:bldLst>
   </p:timing>
 </p:sld>
 </file>

</xml_diff>